<commit_message>
added logo as pdf and svg
</commit_message>
<xml_diff>
--- a/src/site/resources/images/teetime.pptx
+++ b/src/site/resources/images/teetime.pptx
@@ -10,6 +10,7 @@
     <p:sldId id="258" r:id="rId4"/>
     <p:sldId id="259" r:id="rId5"/>
     <p:sldId id="260" r:id="rId6"/>
+    <p:sldId id="261" r:id="rId7"/>
   </p:sldIdLst>
   <p:sldSz cx="12192000" cy="6858000"/>
   <p:notesSz cx="6858000" cy="9144000"/>
@@ -7164,6 +7165,174 @@
 </p:sld>
 </file>
 
+<file path=ppt/slides/slide6.xml><?xml version="1.0" encoding="utf-8"?>
+<p:sld xmlns:a="http://schemas.openxmlformats.org/drawingml/2006/main" xmlns:r="http://schemas.openxmlformats.org/officeDocument/2006/relationships" xmlns:p="http://schemas.openxmlformats.org/presentationml/2006/main">
+  <p:cSld>
+    <p:spTree>
+      <p:nvGrpSpPr>
+        <p:cNvPr id="1" name=""/>
+        <p:cNvGrpSpPr/>
+        <p:nvPr/>
+      </p:nvGrpSpPr>
+      <p:grpSpPr>
+        <a:xfrm>
+          <a:off x="0" y="0"/>
+          <a:ext cx="0" cy="0"/>
+          <a:chOff x="0" y="0"/>
+          <a:chExt cx="0" cy="0"/>
+        </a:xfrm>
+      </p:grpSpPr>
+      <p:sp>
+        <p:nvSpPr>
+          <p:cNvPr id="2" name="TextBox 1"/>
+          <p:cNvSpPr txBox="1"/>
+          <p:nvPr/>
+        </p:nvSpPr>
+        <p:spPr>
+          <a:xfrm>
+            <a:off x="3677985" y="2770026"/>
+            <a:ext cx="1634422" cy="615553"/>
+          </a:xfrm>
+          <a:prstGeom prst="rect">
+            <a:avLst/>
+          </a:prstGeom>
+          <a:noFill/>
+        </p:spPr>
+        <p:txBody>
+          <a:bodyPr wrap="none" tIns="0" rIns="0" bIns="0" rtlCol="0">
+            <a:spAutoFit/>
+          </a:bodyPr>
+          <a:lstStyle/>
+          <a:p>
+            <a:r>
+              <a:rPr lang="de-DE" sz="4000" dirty="0" err="1" smtClean="0">
+                <a:ln w="0"/>
+                <a:solidFill>
+                  <a:schemeClr val="tx1">
+                    <a:lumMod val="75000"/>
+                    <a:lumOff val="25000"/>
+                  </a:schemeClr>
+                </a:solidFill>
+                <a:effectLst/>
+              </a:rPr>
+              <a:t>eeTime</a:t>
+            </a:r>
+            <a:endParaRPr lang="de-DE" sz="4000" dirty="0">
+              <a:ln w="0"/>
+              <a:solidFill>
+                <a:schemeClr val="tx1">
+                  <a:lumMod val="75000"/>
+                  <a:lumOff val="25000"/>
+                </a:schemeClr>
+              </a:solidFill>
+              <a:effectLst/>
+            </a:endParaRPr>
+          </a:p>
+        </p:txBody>
+      </p:sp>
+      <p:sp>
+        <p:nvSpPr>
+          <p:cNvPr id="3" name="TextBox 2"/>
+          <p:cNvSpPr txBox="1"/>
+          <p:nvPr/>
+        </p:nvSpPr>
+        <p:spPr>
+          <a:xfrm>
+            <a:off x="3490433" y="2532794"/>
+            <a:ext cx="375103" cy="923330"/>
+          </a:xfrm>
+          <a:prstGeom prst="rect">
+            <a:avLst/>
+          </a:prstGeom>
+          <a:noFill/>
+          <a:effectLst/>
+        </p:spPr>
+        <p:txBody>
+          <a:bodyPr wrap="none" lIns="0" tIns="0" rIns="0" bIns="0" rtlCol="0">
+            <a:spAutoFit/>
+          </a:bodyPr>
+          <a:lstStyle/>
+          <a:p>
+            <a:r>
+              <a:rPr lang="de-DE" sz="6000" dirty="0" smtClean="0">
+                <a:ln w="0"/>
+                <a:solidFill>
+                  <a:schemeClr val="tx1">
+                    <a:lumMod val="75000"/>
+                    <a:lumOff val="25000"/>
+                  </a:schemeClr>
+                </a:solidFill>
+                <a:effectLst/>
+              </a:rPr>
+              <a:t>T</a:t>
+            </a:r>
+            <a:endParaRPr lang="de-DE" sz="6000" dirty="0">
+              <a:ln w="0"/>
+              <a:solidFill>
+                <a:schemeClr val="tx1">
+                  <a:lumMod val="75000"/>
+                  <a:lumOff val="25000"/>
+                </a:schemeClr>
+              </a:solidFill>
+              <a:effectLst/>
+            </a:endParaRPr>
+          </a:p>
+        </p:txBody>
+      </p:sp>
+      <p:sp>
+        <p:nvSpPr>
+          <p:cNvPr id="4" name="TextBox 3"/>
+          <p:cNvSpPr txBox="1"/>
+          <p:nvPr/>
+        </p:nvSpPr>
+        <p:spPr>
+          <a:xfrm>
+            <a:off x="5256483" y="2748238"/>
+            <a:ext cx="379207" cy="707886"/>
+          </a:xfrm>
+          <a:prstGeom prst="rect">
+            <a:avLst/>
+          </a:prstGeom>
+          <a:noFill/>
+        </p:spPr>
+        <p:txBody>
+          <a:bodyPr wrap="square" rIns="0" rtlCol="0">
+            <a:spAutoFit/>
+          </a:bodyPr>
+          <a:lstStyle/>
+          <a:p>
+            <a:r>
+              <a:rPr lang="de-DE" sz="4000" dirty="0">
+                <a:ln w="0"/>
+                <a:solidFill>
+                  <a:schemeClr val="tx1">
+                    <a:lumMod val="75000"/>
+                    <a:lumOff val="25000"/>
+                  </a:schemeClr>
+                </a:solidFill>
+                <a:effectLst/>
+              </a:rPr>
+              <a:t>≡</a:t>
+            </a:r>
+            <a:endParaRPr lang="de-DE" sz="4000" dirty="0">
+              <a:effectLst/>
+            </a:endParaRPr>
+          </a:p>
+        </p:txBody>
+      </p:sp>
+    </p:spTree>
+    <p:extLst>
+      <p:ext uri="{BB962C8B-B14F-4D97-AF65-F5344CB8AC3E}">
+        <p14:creationId xmlns:p14="http://schemas.microsoft.com/office/powerpoint/2010/main" val="3425945009"/>
+      </p:ext>
+    </p:extLst>
+  </p:cSld>
+  <p:clrMapOvr>
+    <a:masterClrMapping/>
+  </p:clrMapOvr>
+</p:sld>
+</file>
+
 <file path=ppt/theme/theme1.xml><?xml version="1.0" encoding="utf-8"?>
 <a:theme xmlns:a="http://schemas.openxmlformats.org/drawingml/2006/main" name="Office Theme">
   <a:themeElements>

</xml_diff>

<commit_message>
added t and tt pdfs
</commit_message>
<xml_diff>
--- a/src/site/resources/images/teetime.pptx
+++ b/src/site/resources/images/teetime.pptx
@@ -7320,6 +7320,184 @@
           </a:p>
         </p:txBody>
       </p:sp>
+      <p:sp>
+        <p:nvSpPr>
+          <p:cNvPr id="5" name="TextBox 4"/>
+          <p:cNvSpPr txBox="1"/>
+          <p:nvPr/>
+        </p:nvSpPr>
+        <p:spPr>
+          <a:xfrm>
+            <a:off x="8417808" y="4557500"/>
+            <a:ext cx="413578" cy="707886"/>
+          </a:xfrm>
+          <a:prstGeom prst="rect">
+            <a:avLst/>
+          </a:prstGeom>
+          <a:noFill/>
+        </p:spPr>
+        <p:txBody>
+          <a:bodyPr wrap="square" rIns="0" rtlCol="0">
+            <a:spAutoFit/>
+          </a:bodyPr>
+          <a:lstStyle/>
+          <a:p>
+            <a:r>
+              <a:rPr lang="de-DE" sz="4000" dirty="0" smtClean="0">
+                <a:ln w="0"/>
+                <a:solidFill>
+                  <a:schemeClr val="tx1">
+                    <a:lumMod val="75000"/>
+                    <a:lumOff val="25000"/>
+                  </a:schemeClr>
+                </a:solidFill>
+                <a:effectLst/>
+              </a:rPr>
+              <a:t>≡</a:t>
+            </a:r>
+            <a:endParaRPr lang="de-DE" sz="4000" dirty="0">
+              <a:effectLst/>
+            </a:endParaRPr>
+          </a:p>
+        </p:txBody>
+      </p:sp>
+      <p:sp>
+        <p:nvSpPr>
+          <p:cNvPr id="6" name="TextBox 5"/>
+          <p:cNvSpPr txBox="1"/>
+          <p:nvPr/>
+        </p:nvSpPr>
+        <p:spPr>
+          <a:xfrm>
+            <a:off x="8230446" y="4556768"/>
+            <a:ext cx="263855" cy="615553"/>
+          </a:xfrm>
+          <a:prstGeom prst="rect">
+            <a:avLst/>
+          </a:prstGeom>
+          <a:noFill/>
+        </p:spPr>
+        <p:txBody>
+          <a:bodyPr wrap="none" tIns="0" rIns="0" bIns="0" rtlCol="0">
+            <a:spAutoFit/>
+          </a:bodyPr>
+          <a:lstStyle/>
+          <a:p>
+            <a:r>
+              <a:rPr lang="de-DE" sz="4000" dirty="0" smtClean="0">
+                <a:ln w="0"/>
+                <a:solidFill>
+                  <a:schemeClr val="tx1">
+                    <a:lumMod val="75000"/>
+                    <a:lumOff val="25000"/>
+                  </a:schemeClr>
+                </a:solidFill>
+                <a:effectLst/>
+              </a:rPr>
+              <a:t>t</a:t>
+            </a:r>
+            <a:endParaRPr lang="de-DE" sz="4000" dirty="0">
+              <a:ln w="0"/>
+              <a:solidFill>
+                <a:schemeClr val="tx1">
+                  <a:lumMod val="75000"/>
+                  <a:lumOff val="25000"/>
+                </a:schemeClr>
+              </a:solidFill>
+              <a:effectLst/>
+            </a:endParaRPr>
+          </a:p>
+        </p:txBody>
+      </p:sp>
+      <p:sp>
+        <p:nvSpPr>
+          <p:cNvPr id="7" name="TextBox 6"/>
+          <p:cNvSpPr txBox="1"/>
+          <p:nvPr/>
+        </p:nvSpPr>
+        <p:spPr>
+          <a:xfrm>
+            <a:off x="6866454" y="5173053"/>
+            <a:ext cx="413578" cy="707886"/>
+          </a:xfrm>
+          <a:prstGeom prst="rect">
+            <a:avLst/>
+          </a:prstGeom>
+          <a:noFill/>
+        </p:spPr>
+        <p:txBody>
+          <a:bodyPr wrap="square" rIns="0" rtlCol="0">
+            <a:spAutoFit/>
+          </a:bodyPr>
+          <a:lstStyle/>
+          <a:p>
+            <a:r>
+              <a:rPr lang="de-DE" sz="4000" dirty="0" smtClean="0">
+                <a:ln w="0"/>
+                <a:solidFill>
+                  <a:schemeClr val="tx1">
+                    <a:lumMod val="75000"/>
+                    <a:lumOff val="25000"/>
+                  </a:schemeClr>
+                </a:solidFill>
+                <a:effectLst/>
+              </a:rPr>
+              <a:t>≡</a:t>
+            </a:r>
+            <a:endParaRPr lang="de-DE" sz="4000" dirty="0">
+              <a:effectLst/>
+            </a:endParaRPr>
+          </a:p>
+        </p:txBody>
+      </p:sp>
+      <p:sp>
+        <p:nvSpPr>
+          <p:cNvPr id="8" name="TextBox 7"/>
+          <p:cNvSpPr txBox="1"/>
+          <p:nvPr/>
+        </p:nvSpPr>
+        <p:spPr>
+          <a:xfrm>
+            <a:off x="6521554" y="5173053"/>
+            <a:ext cx="428131" cy="615553"/>
+          </a:xfrm>
+          <a:prstGeom prst="rect">
+            <a:avLst/>
+          </a:prstGeom>
+          <a:noFill/>
+        </p:spPr>
+        <p:txBody>
+          <a:bodyPr wrap="none" tIns="0" rIns="0" bIns="0" rtlCol="0">
+            <a:spAutoFit/>
+          </a:bodyPr>
+          <a:lstStyle/>
+          <a:p>
+            <a:r>
+              <a:rPr lang="de-DE" sz="4000" dirty="0" err="1" smtClean="0">
+                <a:ln w="0"/>
+                <a:solidFill>
+                  <a:schemeClr val="tx1">
+                    <a:lumMod val="75000"/>
+                    <a:lumOff val="25000"/>
+                  </a:schemeClr>
+                </a:solidFill>
+                <a:effectLst/>
+              </a:rPr>
+              <a:t>tt</a:t>
+            </a:r>
+            <a:endParaRPr lang="de-DE" sz="4000" dirty="0">
+              <a:ln w="0"/>
+              <a:solidFill>
+                <a:schemeClr val="tx1">
+                  <a:lumMod val="75000"/>
+                  <a:lumOff val="25000"/>
+                </a:schemeClr>
+              </a:solidFill>
+              <a:effectLst/>
+            </a:endParaRPr>
+          </a:p>
+        </p:txBody>
+      </p:sp>
     </p:spTree>
     <p:extLst>
       <p:ext uri="{BB962C8B-B14F-4D97-AF65-F5344CB8AC3E}">

</xml_diff>

<commit_message>
added favicon proposals as PDFs
</commit_message>
<xml_diff>
--- a/src/site/resources/images/teetime.pptx
+++ b/src/site/resources/images/teetime.pptx
@@ -4,6 +4,9 @@
   <p:sldMasterIdLst>
     <p:sldMasterId id="2147483648" r:id="rId1"/>
   </p:sldMasterIdLst>
+  <p:notesMasterIdLst>
+    <p:notesMasterId r:id="rId14"/>
+  </p:notesMasterIdLst>
   <p:sldIdLst>
     <p:sldId id="256" r:id="rId2"/>
     <p:sldId id="257" r:id="rId3"/>
@@ -11,6 +14,12 @@
     <p:sldId id="259" r:id="rId5"/>
     <p:sldId id="260" r:id="rId6"/>
     <p:sldId id="261" r:id="rId7"/>
+    <p:sldId id="262" r:id="rId8"/>
+    <p:sldId id="263" r:id="rId9"/>
+    <p:sldId id="264" r:id="rId10"/>
+    <p:sldId id="265" r:id="rId11"/>
+    <p:sldId id="266" r:id="rId12"/>
+    <p:sldId id="267" r:id="rId13"/>
   </p:sldIdLst>
   <p:sldSz cx="12192000" cy="6858000"/>
   <p:notesSz cx="6858000" cy="9144000"/>
@@ -127,6 +136,1196 @@
     </p:extLst>
   </p:cmAuthor>
 </p:cmAuthorLst>
+</file>
+
+<file path=ppt/notesMasters/notesMaster1.xml><?xml version="1.0" encoding="utf-8"?>
+<p:notesMaster xmlns:a="http://schemas.openxmlformats.org/drawingml/2006/main" xmlns:r="http://schemas.openxmlformats.org/officeDocument/2006/relationships" xmlns:p="http://schemas.openxmlformats.org/presentationml/2006/main">
+  <p:cSld>
+    <p:bg>
+      <p:bgRef idx="1001">
+        <a:schemeClr val="bg1"/>
+      </p:bgRef>
+    </p:bg>
+    <p:spTree>
+      <p:nvGrpSpPr>
+        <p:cNvPr id="1" name=""/>
+        <p:cNvGrpSpPr/>
+        <p:nvPr/>
+      </p:nvGrpSpPr>
+      <p:grpSpPr>
+        <a:xfrm>
+          <a:off x="0" y="0"/>
+          <a:ext cx="0" cy="0"/>
+          <a:chOff x="0" y="0"/>
+          <a:chExt cx="0" cy="0"/>
+        </a:xfrm>
+      </p:grpSpPr>
+      <p:sp>
+        <p:nvSpPr>
+          <p:cNvPr id="2" name="Header Placeholder 1"/>
+          <p:cNvSpPr>
+            <a:spLocks noGrp="1"/>
+          </p:cNvSpPr>
+          <p:nvPr>
+            <p:ph type="hdr" sz="quarter"/>
+          </p:nvPr>
+        </p:nvSpPr>
+        <p:spPr>
+          <a:xfrm>
+            <a:off x="0" y="0"/>
+            <a:ext cx="2971800" cy="458788"/>
+          </a:xfrm>
+          <a:prstGeom prst="rect">
+            <a:avLst/>
+          </a:prstGeom>
+        </p:spPr>
+        <p:txBody>
+          <a:bodyPr vert="horz" lIns="91440" tIns="45720" rIns="91440" bIns="45720" rtlCol="0"/>
+          <a:lstStyle>
+            <a:lvl1pPr algn="l">
+              <a:defRPr sz="1200"/>
+            </a:lvl1pPr>
+          </a:lstStyle>
+          <a:p>
+            <a:endParaRPr lang="de-DE"/>
+          </a:p>
+        </p:txBody>
+      </p:sp>
+      <p:sp>
+        <p:nvSpPr>
+          <p:cNvPr id="3" name="Date Placeholder 2"/>
+          <p:cNvSpPr>
+            <a:spLocks noGrp="1"/>
+          </p:cNvSpPr>
+          <p:nvPr>
+            <p:ph type="dt" idx="1"/>
+          </p:nvPr>
+        </p:nvSpPr>
+        <p:spPr>
+          <a:xfrm>
+            <a:off x="3884613" y="0"/>
+            <a:ext cx="2971800" cy="458788"/>
+          </a:xfrm>
+          <a:prstGeom prst="rect">
+            <a:avLst/>
+          </a:prstGeom>
+        </p:spPr>
+        <p:txBody>
+          <a:bodyPr vert="horz" lIns="91440" tIns="45720" rIns="91440" bIns="45720" rtlCol="0"/>
+          <a:lstStyle>
+            <a:lvl1pPr algn="r">
+              <a:defRPr sz="1200"/>
+            </a:lvl1pPr>
+          </a:lstStyle>
+          <a:p>
+            <a:fld id="{35FB3322-8137-4149-9F14-9A06CD7D0F5A}" type="datetimeFigureOut">
+              <a:rPr lang="de-DE" smtClean="0"/>
+              <a:t>16.12.2014</a:t>
+            </a:fld>
+            <a:endParaRPr lang="de-DE"/>
+          </a:p>
+        </p:txBody>
+      </p:sp>
+      <p:sp>
+        <p:nvSpPr>
+          <p:cNvPr id="4" name="Slide Image Placeholder 3"/>
+          <p:cNvSpPr>
+            <a:spLocks noGrp="1" noRot="1" noChangeAspect="1"/>
+          </p:cNvSpPr>
+          <p:nvPr>
+            <p:ph type="sldImg" idx="2"/>
+          </p:nvPr>
+        </p:nvSpPr>
+        <p:spPr>
+          <a:xfrm>
+            <a:off x="685800" y="1143000"/>
+            <a:ext cx="5486400" cy="3086100"/>
+          </a:xfrm>
+          <a:prstGeom prst="rect">
+            <a:avLst/>
+          </a:prstGeom>
+          <a:noFill/>
+          <a:ln w="12700">
+            <a:solidFill>
+              <a:prstClr val="black"/>
+            </a:solidFill>
+          </a:ln>
+        </p:spPr>
+        <p:txBody>
+          <a:bodyPr vert="horz" lIns="91440" tIns="45720" rIns="91440" bIns="45720" rtlCol="0" anchor="ctr"/>
+          <a:lstStyle/>
+          <a:p>
+            <a:endParaRPr lang="de-DE"/>
+          </a:p>
+        </p:txBody>
+      </p:sp>
+      <p:sp>
+        <p:nvSpPr>
+          <p:cNvPr id="5" name="Notes Placeholder 4"/>
+          <p:cNvSpPr>
+            <a:spLocks noGrp="1"/>
+          </p:cNvSpPr>
+          <p:nvPr>
+            <p:ph type="body" sz="quarter" idx="3"/>
+          </p:nvPr>
+        </p:nvSpPr>
+        <p:spPr>
+          <a:xfrm>
+            <a:off x="685800" y="4400550"/>
+            <a:ext cx="5486400" cy="3600450"/>
+          </a:xfrm>
+          <a:prstGeom prst="rect">
+            <a:avLst/>
+          </a:prstGeom>
+        </p:spPr>
+        <p:txBody>
+          <a:bodyPr vert="horz" lIns="91440" tIns="45720" rIns="91440" bIns="45720" rtlCol="0"/>
+          <a:lstStyle/>
+          <a:p>
+            <a:pPr lvl="0"/>
+            <a:r>
+              <a:rPr lang="en-US" smtClean="0"/>
+              <a:t>Click to edit Master text styles</a:t>
+            </a:r>
+          </a:p>
+          <a:p>
+            <a:pPr lvl="1"/>
+            <a:r>
+              <a:rPr lang="en-US" smtClean="0"/>
+              <a:t>Second level</a:t>
+            </a:r>
+          </a:p>
+          <a:p>
+            <a:pPr lvl="2"/>
+            <a:r>
+              <a:rPr lang="en-US" smtClean="0"/>
+              <a:t>Third level</a:t>
+            </a:r>
+          </a:p>
+          <a:p>
+            <a:pPr lvl="3"/>
+            <a:r>
+              <a:rPr lang="en-US" smtClean="0"/>
+              <a:t>Fourth level</a:t>
+            </a:r>
+          </a:p>
+          <a:p>
+            <a:pPr lvl="4"/>
+            <a:r>
+              <a:rPr lang="en-US" smtClean="0"/>
+              <a:t>Fifth level</a:t>
+            </a:r>
+            <a:endParaRPr lang="de-DE"/>
+          </a:p>
+        </p:txBody>
+      </p:sp>
+      <p:sp>
+        <p:nvSpPr>
+          <p:cNvPr id="6" name="Footer Placeholder 5"/>
+          <p:cNvSpPr>
+            <a:spLocks noGrp="1"/>
+          </p:cNvSpPr>
+          <p:nvPr>
+            <p:ph type="ftr" sz="quarter" idx="4"/>
+          </p:nvPr>
+        </p:nvSpPr>
+        <p:spPr>
+          <a:xfrm>
+            <a:off x="0" y="8685213"/>
+            <a:ext cx="2971800" cy="458787"/>
+          </a:xfrm>
+          <a:prstGeom prst="rect">
+            <a:avLst/>
+          </a:prstGeom>
+        </p:spPr>
+        <p:txBody>
+          <a:bodyPr vert="horz" lIns="91440" tIns="45720" rIns="91440" bIns="45720" rtlCol="0" anchor="b"/>
+          <a:lstStyle>
+            <a:lvl1pPr algn="l">
+              <a:defRPr sz="1200"/>
+            </a:lvl1pPr>
+          </a:lstStyle>
+          <a:p>
+            <a:endParaRPr lang="de-DE"/>
+          </a:p>
+        </p:txBody>
+      </p:sp>
+      <p:sp>
+        <p:nvSpPr>
+          <p:cNvPr id="7" name="Slide Number Placeholder 6"/>
+          <p:cNvSpPr>
+            <a:spLocks noGrp="1"/>
+          </p:cNvSpPr>
+          <p:nvPr>
+            <p:ph type="sldNum" sz="quarter" idx="5"/>
+          </p:nvPr>
+        </p:nvSpPr>
+        <p:spPr>
+          <a:xfrm>
+            <a:off x="3884613" y="8685213"/>
+            <a:ext cx="2971800" cy="458787"/>
+          </a:xfrm>
+          <a:prstGeom prst="rect">
+            <a:avLst/>
+          </a:prstGeom>
+        </p:spPr>
+        <p:txBody>
+          <a:bodyPr vert="horz" lIns="91440" tIns="45720" rIns="91440" bIns="45720" rtlCol="0" anchor="b"/>
+          <a:lstStyle>
+            <a:lvl1pPr algn="r">
+              <a:defRPr sz="1200"/>
+            </a:lvl1pPr>
+          </a:lstStyle>
+          <a:p>
+            <a:fld id="{D846DCDD-C48E-4755-8310-45DFD4650B4A}" type="slidenum">
+              <a:rPr lang="de-DE" smtClean="0"/>
+              <a:t>‹#›</a:t>
+            </a:fld>
+            <a:endParaRPr lang="de-DE"/>
+          </a:p>
+        </p:txBody>
+      </p:sp>
+    </p:spTree>
+    <p:extLst>
+      <p:ext uri="{BB962C8B-B14F-4D97-AF65-F5344CB8AC3E}">
+        <p14:creationId xmlns:p14="http://schemas.microsoft.com/office/powerpoint/2010/main" val="2878057546"/>
+      </p:ext>
+    </p:extLst>
+  </p:cSld>
+  <p:clrMap bg1="lt1" tx1="dk1" bg2="lt2" tx2="dk2" accent1="accent1" accent2="accent2" accent3="accent3" accent4="accent4" accent5="accent5" accent6="accent6" hlink="hlink" folHlink="folHlink"/>
+  <p:notesStyle>
+    <a:lvl1pPr marL="0" algn="l" defTabSz="914400" rtl="0" eaLnBrk="1" latinLnBrk="0" hangingPunct="1">
+      <a:defRPr sz="1200" kern="1200">
+        <a:solidFill>
+          <a:schemeClr val="tx1"/>
+        </a:solidFill>
+        <a:latin typeface="+mn-lt"/>
+        <a:ea typeface="+mn-ea"/>
+        <a:cs typeface="+mn-cs"/>
+      </a:defRPr>
+    </a:lvl1pPr>
+    <a:lvl2pPr marL="457200" algn="l" defTabSz="914400" rtl="0" eaLnBrk="1" latinLnBrk="0" hangingPunct="1">
+      <a:defRPr sz="1200" kern="1200">
+        <a:solidFill>
+          <a:schemeClr val="tx1"/>
+        </a:solidFill>
+        <a:latin typeface="+mn-lt"/>
+        <a:ea typeface="+mn-ea"/>
+        <a:cs typeface="+mn-cs"/>
+      </a:defRPr>
+    </a:lvl2pPr>
+    <a:lvl3pPr marL="914400" algn="l" defTabSz="914400" rtl="0" eaLnBrk="1" latinLnBrk="0" hangingPunct="1">
+      <a:defRPr sz="1200" kern="1200">
+        <a:solidFill>
+          <a:schemeClr val="tx1"/>
+        </a:solidFill>
+        <a:latin typeface="+mn-lt"/>
+        <a:ea typeface="+mn-ea"/>
+        <a:cs typeface="+mn-cs"/>
+      </a:defRPr>
+    </a:lvl3pPr>
+    <a:lvl4pPr marL="1371600" algn="l" defTabSz="914400" rtl="0" eaLnBrk="1" latinLnBrk="0" hangingPunct="1">
+      <a:defRPr sz="1200" kern="1200">
+        <a:solidFill>
+          <a:schemeClr val="tx1"/>
+        </a:solidFill>
+        <a:latin typeface="+mn-lt"/>
+        <a:ea typeface="+mn-ea"/>
+        <a:cs typeface="+mn-cs"/>
+      </a:defRPr>
+    </a:lvl4pPr>
+    <a:lvl5pPr marL="1828800" algn="l" defTabSz="914400" rtl="0" eaLnBrk="1" latinLnBrk="0" hangingPunct="1">
+      <a:defRPr sz="1200" kern="1200">
+        <a:solidFill>
+          <a:schemeClr val="tx1"/>
+        </a:solidFill>
+        <a:latin typeface="+mn-lt"/>
+        <a:ea typeface="+mn-ea"/>
+        <a:cs typeface="+mn-cs"/>
+      </a:defRPr>
+    </a:lvl5pPr>
+    <a:lvl6pPr marL="2286000" algn="l" defTabSz="914400" rtl="0" eaLnBrk="1" latinLnBrk="0" hangingPunct="1">
+      <a:defRPr sz="1200" kern="1200">
+        <a:solidFill>
+          <a:schemeClr val="tx1"/>
+        </a:solidFill>
+        <a:latin typeface="+mn-lt"/>
+        <a:ea typeface="+mn-ea"/>
+        <a:cs typeface="+mn-cs"/>
+      </a:defRPr>
+    </a:lvl6pPr>
+    <a:lvl7pPr marL="2743200" algn="l" defTabSz="914400" rtl="0" eaLnBrk="1" latinLnBrk="0" hangingPunct="1">
+      <a:defRPr sz="1200" kern="1200">
+        <a:solidFill>
+          <a:schemeClr val="tx1"/>
+        </a:solidFill>
+        <a:latin typeface="+mn-lt"/>
+        <a:ea typeface="+mn-ea"/>
+        <a:cs typeface="+mn-cs"/>
+      </a:defRPr>
+    </a:lvl7pPr>
+    <a:lvl8pPr marL="3200400" algn="l" defTabSz="914400" rtl="0" eaLnBrk="1" latinLnBrk="0" hangingPunct="1">
+      <a:defRPr sz="1200" kern="1200">
+        <a:solidFill>
+          <a:schemeClr val="tx1"/>
+        </a:solidFill>
+        <a:latin typeface="+mn-lt"/>
+        <a:ea typeface="+mn-ea"/>
+        <a:cs typeface="+mn-cs"/>
+      </a:defRPr>
+    </a:lvl8pPr>
+    <a:lvl9pPr marL="3657600" algn="l" defTabSz="914400" rtl="0" eaLnBrk="1" latinLnBrk="0" hangingPunct="1">
+      <a:defRPr sz="1200" kern="1200">
+        <a:solidFill>
+          <a:schemeClr val="tx1"/>
+        </a:solidFill>
+        <a:latin typeface="+mn-lt"/>
+        <a:ea typeface="+mn-ea"/>
+        <a:cs typeface="+mn-cs"/>
+      </a:defRPr>
+    </a:lvl9pPr>
+  </p:notesStyle>
+</p:notesMaster>
+</file>
+
+<file path=ppt/notesSlides/notesSlide1.xml><?xml version="1.0" encoding="utf-8"?>
+<p:notes xmlns:a="http://schemas.openxmlformats.org/drawingml/2006/main" xmlns:r="http://schemas.openxmlformats.org/officeDocument/2006/relationships" xmlns:p="http://schemas.openxmlformats.org/presentationml/2006/main">
+  <p:cSld>
+    <p:spTree>
+      <p:nvGrpSpPr>
+        <p:cNvPr id="1" name=""/>
+        <p:cNvGrpSpPr/>
+        <p:nvPr/>
+      </p:nvGrpSpPr>
+      <p:grpSpPr>
+        <a:xfrm>
+          <a:off x="0" y="0"/>
+          <a:ext cx="0" cy="0"/>
+          <a:chOff x="0" y="0"/>
+          <a:chExt cx="0" cy="0"/>
+        </a:xfrm>
+      </p:grpSpPr>
+      <p:sp>
+        <p:nvSpPr>
+          <p:cNvPr id="2" name="Slide Image Placeholder 1"/>
+          <p:cNvSpPr>
+            <a:spLocks noGrp="1" noRot="1" noChangeAspect="1"/>
+          </p:cNvSpPr>
+          <p:nvPr>
+            <p:ph type="sldImg"/>
+          </p:nvPr>
+        </p:nvSpPr>
+        <p:spPr/>
+      </p:sp>
+      <p:sp>
+        <p:nvSpPr>
+          <p:cNvPr id="3" name="Notes Placeholder 2"/>
+          <p:cNvSpPr>
+            <a:spLocks noGrp="1"/>
+          </p:cNvSpPr>
+          <p:nvPr>
+            <p:ph type="body" idx="1"/>
+          </p:nvPr>
+        </p:nvSpPr>
+        <p:spPr/>
+        <p:txBody>
+          <a:bodyPr/>
+          <a:lstStyle/>
+          <a:p>
+            <a:endParaRPr lang="de-DE"/>
+          </a:p>
+        </p:txBody>
+      </p:sp>
+      <p:sp>
+        <p:nvSpPr>
+          <p:cNvPr id="4" name="Slide Number Placeholder 3"/>
+          <p:cNvSpPr>
+            <a:spLocks noGrp="1"/>
+          </p:cNvSpPr>
+          <p:nvPr>
+            <p:ph type="sldNum" sz="quarter" idx="10"/>
+          </p:nvPr>
+        </p:nvSpPr>
+        <p:spPr/>
+        <p:txBody>
+          <a:bodyPr/>
+          <a:lstStyle/>
+          <a:p>
+            <a:fld id="{D846DCDD-C48E-4755-8310-45DFD4650B4A}" type="slidenum">
+              <a:rPr lang="de-DE" smtClean="0"/>
+              <a:t>1</a:t>
+            </a:fld>
+            <a:endParaRPr lang="de-DE"/>
+          </a:p>
+        </p:txBody>
+      </p:sp>
+    </p:spTree>
+    <p:extLst>
+      <p:ext uri="{BB962C8B-B14F-4D97-AF65-F5344CB8AC3E}">
+        <p14:creationId xmlns:p14="http://schemas.microsoft.com/office/powerpoint/2010/main" val="1728945903"/>
+      </p:ext>
+    </p:extLst>
+  </p:cSld>
+  <p:clrMapOvr>
+    <a:masterClrMapping/>
+  </p:clrMapOvr>
+</p:notes>
+</file>
+
+<file path=ppt/notesSlides/notesSlide10.xml><?xml version="1.0" encoding="utf-8"?>
+<p:notes xmlns:a="http://schemas.openxmlformats.org/drawingml/2006/main" xmlns:r="http://schemas.openxmlformats.org/officeDocument/2006/relationships" xmlns:p="http://schemas.openxmlformats.org/presentationml/2006/main">
+  <p:cSld>
+    <p:spTree>
+      <p:nvGrpSpPr>
+        <p:cNvPr id="1" name=""/>
+        <p:cNvGrpSpPr/>
+        <p:nvPr/>
+      </p:nvGrpSpPr>
+      <p:grpSpPr>
+        <a:xfrm>
+          <a:off x="0" y="0"/>
+          <a:ext cx="0" cy="0"/>
+          <a:chOff x="0" y="0"/>
+          <a:chExt cx="0" cy="0"/>
+        </a:xfrm>
+      </p:grpSpPr>
+      <p:sp>
+        <p:nvSpPr>
+          <p:cNvPr id="2" name="Slide Image Placeholder 1"/>
+          <p:cNvSpPr>
+            <a:spLocks noGrp="1" noRot="1" noChangeAspect="1"/>
+          </p:cNvSpPr>
+          <p:nvPr>
+            <p:ph type="sldImg"/>
+          </p:nvPr>
+        </p:nvSpPr>
+        <p:spPr/>
+      </p:sp>
+      <p:sp>
+        <p:nvSpPr>
+          <p:cNvPr id="3" name="Notes Placeholder 2"/>
+          <p:cNvSpPr>
+            <a:spLocks noGrp="1"/>
+          </p:cNvSpPr>
+          <p:nvPr>
+            <p:ph type="body" idx="1"/>
+          </p:nvPr>
+        </p:nvSpPr>
+        <p:spPr/>
+        <p:txBody>
+          <a:bodyPr/>
+          <a:lstStyle/>
+          <a:p>
+            <a:endParaRPr lang="de-DE"/>
+          </a:p>
+        </p:txBody>
+      </p:sp>
+      <p:sp>
+        <p:nvSpPr>
+          <p:cNvPr id="4" name="Slide Number Placeholder 3"/>
+          <p:cNvSpPr>
+            <a:spLocks noGrp="1"/>
+          </p:cNvSpPr>
+          <p:nvPr>
+            <p:ph type="sldNum" sz="quarter" idx="10"/>
+          </p:nvPr>
+        </p:nvSpPr>
+        <p:spPr/>
+        <p:txBody>
+          <a:bodyPr/>
+          <a:lstStyle/>
+          <a:p>
+            <a:fld id="{D846DCDD-C48E-4755-8310-45DFD4650B4A}" type="slidenum">
+              <a:rPr lang="de-DE" smtClean="0"/>
+              <a:t>10</a:t>
+            </a:fld>
+            <a:endParaRPr lang="de-DE"/>
+          </a:p>
+        </p:txBody>
+      </p:sp>
+    </p:spTree>
+    <p:extLst>
+      <p:ext uri="{BB962C8B-B14F-4D97-AF65-F5344CB8AC3E}">
+        <p14:creationId xmlns:p14="http://schemas.microsoft.com/office/powerpoint/2010/main" val="3761716102"/>
+      </p:ext>
+    </p:extLst>
+  </p:cSld>
+  <p:clrMapOvr>
+    <a:masterClrMapping/>
+  </p:clrMapOvr>
+</p:notes>
+</file>
+
+<file path=ppt/notesSlides/notesSlide2.xml><?xml version="1.0" encoding="utf-8"?>
+<p:notes xmlns:a="http://schemas.openxmlformats.org/drawingml/2006/main" xmlns:r="http://schemas.openxmlformats.org/officeDocument/2006/relationships" xmlns:p="http://schemas.openxmlformats.org/presentationml/2006/main">
+  <p:cSld>
+    <p:spTree>
+      <p:nvGrpSpPr>
+        <p:cNvPr id="1" name=""/>
+        <p:cNvGrpSpPr/>
+        <p:nvPr/>
+      </p:nvGrpSpPr>
+      <p:grpSpPr>
+        <a:xfrm>
+          <a:off x="0" y="0"/>
+          <a:ext cx="0" cy="0"/>
+          <a:chOff x="0" y="0"/>
+          <a:chExt cx="0" cy="0"/>
+        </a:xfrm>
+      </p:grpSpPr>
+      <p:sp>
+        <p:nvSpPr>
+          <p:cNvPr id="2" name="Slide Image Placeholder 1"/>
+          <p:cNvSpPr>
+            <a:spLocks noGrp="1" noRot="1" noChangeAspect="1"/>
+          </p:cNvSpPr>
+          <p:nvPr>
+            <p:ph type="sldImg"/>
+          </p:nvPr>
+        </p:nvSpPr>
+        <p:spPr/>
+      </p:sp>
+      <p:sp>
+        <p:nvSpPr>
+          <p:cNvPr id="3" name="Notes Placeholder 2"/>
+          <p:cNvSpPr>
+            <a:spLocks noGrp="1"/>
+          </p:cNvSpPr>
+          <p:nvPr>
+            <p:ph type="body" idx="1"/>
+          </p:nvPr>
+        </p:nvSpPr>
+        <p:spPr/>
+        <p:txBody>
+          <a:bodyPr/>
+          <a:lstStyle/>
+          <a:p>
+            <a:endParaRPr lang="de-DE"/>
+          </a:p>
+        </p:txBody>
+      </p:sp>
+      <p:sp>
+        <p:nvSpPr>
+          <p:cNvPr id="4" name="Slide Number Placeholder 3"/>
+          <p:cNvSpPr>
+            <a:spLocks noGrp="1"/>
+          </p:cNvSpPr>
+          <p:nvPr>
+            <p:ph type="sldNum" sz="quarter" idx="10"/>
+          </p:nvPr>
+        </p:nvSpPr>
+        <p:spPr/>
+        <p:txBody>
+          <a:bodyPr/>
+          <a:lstStyle/>
+          <a:p>
+            <a:fld id="{D846DCDD-C48E-4755-8310-45DFD4650B4A}" type="slidenum">
+              <a:rPr lang="de-DE" smtClean="0"/>
+              <a:t>2</a:t>
+            </a:fld>
+            <a:endParaRPr lang="de-DE"/>
+          </a:p>
+        </p:txBody>
+      </p:sp>
+    </p:spTree>
+    <p:extLst>
+      <p:ext uri="{BB962C8B-B14F-4D97-AF65-F5344CB8AC3E}">
+        <p14:creationId xmlns:p14="http://schemas.microsoft.com/office/powerpoint/2010/main" val="3414291649"/>
+      </p:ext>
+    </p:extLst>
+  </p:cSld>
+  <p:clrMapOvr>
+    <a:masterClrMapping/>
+  </p:clrMapOvr>
+</p:notes>
+</file>
+
+<file path=ppt/notesSlides/notesSlide3.xml><?xml version="1.0" encoding="utf-8"?>
+<p:notes xmlns:a="http://schemas.openxmlformats.org/drawingml/2006/main" xmlns:r="http://schemas.openxmlformats.org/officeDocument/2006/relationships" xmlns:p="http://schemas.openxmlformats.org/presentationml/2006/main">
+  <p:cSld>
+    <p:spTree>
+      <p:nvGrpSpPr>
+        <p:cNvPr id="1" name=""/>
+        <p:cNvGrpSpPr/>
+        <p:nvPr/>
+      </p:nvGrpSpPr>
+      <p:grpSpPr>
+        <a:xfrm>
+          <a:off x="0" y="0"/>
+          <a:ext cx="0" cy="0"/>
+          <a:chOff x="0" y="0"/>
+          <a:chExt cx="0" cy="0"/>
+        </a:xfrm>
+      </p:grpSpPr>
+      <p:sp>
+        <p:nvSpPr>
+          <p:cNvPr id="2" name="Slide Image Placeholder 1"/>
+          <p:cNvSpPr>
+            <a:spLocks noGrp="1" noRot="1" noChangeAspect="1"/>
+          </p:cNvSpPr>
+          <p:nvPr>
+            <p:ph type="sldImg"/>
+          </p:nvPr>
+        </p:nvSpPr>
+        <p:spPr/>
+      </p:sp>
+      <p:sp>
+        <p:nvSpPr>
+          <p:cNvPr id="3" name="Notes Placeholder 2"/>
+          <p:cNvSpPr>
+            <a:spLocks noGrp="1"/>
+          </p:cNvSpPr>
+          <p:nvPr>
+            <p:ph type="body" idx="1"/>
+          </p:nvPr>
+        </p:nvSpPr>
+        <p:spPr/>
+        <p:txBody>
+          <a:bodyPr/>
+          <a:lstStyle/>
+          <a:p>
+            <a:endParaRPr lang="de-DE"/>
+          </a:p>
+        </p:txBody>
+      </p:sp>
+      <p:sp>
+        <p:nvSpPr>
+          <p:cNvPr id="4" name="Slide Number Placeholder 3"/>
+          <p:cNvSpPr>
+            <a:spLocks noGrp="1"/>
+          </p:cNvSpPr>
+          <p:nvPr>
+            <p:ph type="sldNum" sz="quarter" idx="10"/>
+          </p:nvPr>
+        </p:nvSpPr>
+        <p:spPr/>
+        <p:txBody>
+          <a:bodyPr/>
+          <a:lstStyle/>
+          <a:p>
+            <a:fld id="{D846DCDD-C48E-4755-8310-45DFD4650B4A}" type="slidenum">
+              <a:rPr lang="de-DE" smtClean="0"/>
+              <a:t>3</a:t>
+            </a:fld>
+            <a:endParaRPr lang="de-DE"/>
+          </a:p>
+        </p:txBody>
+      </p:sp>
+    </p:spTree>
+    <p:extLst>
+      <p:ext uri="{BB962C8B-B14F-4D97-AF65-F5344CB8AC3E}">
+        <p14:creationId xmlns:p14="http://schemas.microsoft.com/office/powerpoint/2010/main" val="3423526521"/>
+      </p:ext>
+    </p:extLst>
+  </p:cSld>
+  <p:clrMapOvr>
+    <a:masterClrMapping/>
+  </p:clrMapOvr>
+</p:notes>
+</file>
+
+<file path=ppt/notesSlides/notesSlide4.xml><?xml version="1.0" encoding="utf-8"?>
+<p:notes xmlns:a="http://schemas.openxmlformats.org/drawingml/2006/main" xmlns:r="http://schemas.openxmlformats.org/officeDocument/2006/relationships" xmlns:p="http://schemas.openxmlformats.org/presentationml/2006/main">
+  <p:cSld>
+    <p:spTree>
+      <p:nvGrpSpPr>
+        <p:cNvPr id="1" name=""/>
+        <p:cNvGrpSpPr/>
+        <p:nvPr/>
+      </p:nvGrpSpPr>
+      <p:grpSpPr>
+        <a:xfrm>
+          <a:off x="0" y="0"/>
+          <a:ext cx="0" cy="0"/>
+          <a:chOff x="0" y="0"/>
+          <a:chExt cx="0" cy="0"/>
+        </a:xfrm>
+      </p:grpSpPr>
+      <p:sp>
+        <p:nvSpPr>
+          <p:cNvPr id="2" name="Slide Image Placeholder 1"/>
+          <p:cNvSpPr>
+            <a:spLocks noGrp="1" noRot="1" noChangeAspect="1"/>
+          </p:cNvSpPr>
+          <p:nvPr>
+            <p:ph type="sldImg"/>
+          </p:nvPr>
+        </p:nvSpPr>
+        <p:spPr/>
+      </p:sp>
+      <p:sp>
+        <p:nvSpPr>
+          <p:cNvPr id="3" name="Notes Placeholder 2"/>
+          <p:cNvSpPr>
+            <a:spLocks noGrp="1"/>
+          </p:cNvSpPr>
+          <p:nvPr>
+            <p:ph type="body" idx="1"/>
+          </p:nvPr>
+        </p:nvSpPr>
+        <p:spPr/>
+        <p:txBody>
+          <a:bodyPr/>
+          <a:lstStyle/>
+          <a:p>
+            <a:endParaRPr lang="de-DE"/>
+          </a:p>
+        </p:txBody>
+      </p:sp>
+      <p:sp>
+        <p:nvSpPr>
+          <p:cNvPr id="4" name="Slide Number Placeholder 3"/>
+          <p:cNvSpPr>
+            <a:spLocks noGrp="1"/>
+          </p:cNvSpPr>
+          <p:nvPr>
+            <p:ph type="sldNum" sz="quarter" idx="10"/>
+          </p:nvPr>
+        </p:nvSpPr>
+        <p:spPr/>
+        <p:txBody>
+          <a:bodyPr/>
+          <a:lstStyle/>
+          <a:p>
+            <a:fld id="{D846DCDD-C48E-4755-8310-45DFD4650B4A}" type="slidenum">
+              <a:rPr lang="de-DE" smtClean="0"/>
+              <a:t>4</a:t>
+            </a:fld>
+            <a:endParaRPr lang="de-DE"/>
+          </a:p>
+        </p:txBody>
+      </p:sp>
+    </p:spTree>
+    <p:extLst>
+      <p:ext uri="{BB962C8B-B14F-4D97-AF65-F5344CB8AC3E}">
+        <p14:creationId xmlns:p14="http://schemas.microsoft.com/office/powerpoint/2010/main" val="2231472320"/>
+      </p:ext>
+    </p:extLst>
+  </p:cSld>
+  <p:clrMapOvr>
+    <a:masterClrMapping/>
+  </p:clrMapOvr>
+</p:notes>
+</file>
+
+<file path=ppt/notesSlides/notesSlide5.xml><?xml version="1.0" encoding="utf-8"?>
+<p:notes xmlns:a="http://schemas.openxmlformats.org/drawingml/2006/main" xmlns:r="http://schemas.openxmlformats.org/officeDocument/2006/relationships" xmlns:p="http://schemas.openxmlformats.org/presentationml/2006/main">
+  <p:cSld>
+    <p:spTree>
+      <p:nvGrpSpPr>
+        <p:cNvPr id="1" name=""/>
+        <p:cNvGrpSpPr/>
+        <p:nvPr/>
+      </p:nvGrpSpPr>
+      <p:grpSpPr>
+        <a:xfrm>
+          <a:off x="0" y="0"/>
+          <a:ext cx="0" cy="0"/>
+          <a:chOff x="0" y="0"/>
+          <a:chExt cx="0" cy="0"/>
+        </a:xfrm>
+      </p:grpSpPr>
+      <p:sp>
+        <p:nvSpPr>
+          <p:cNvPr id="2" name="Slide Image Placeholder 1"/>
+          <p:cNvSpPr>
+            <a:spLocks noGrp="1" noRot="1" noChangeAspect="1"/>
+          </p:cNvSpPr>
+          <p:nvPr>
+            <p:ph type="sldImg"/>
+          </p:nvPr>
+        </p:nvSpPr>
+        <p:spPr/>
+      </p:sp>
+      <p:sp>
+        <p:nvSpPr>
+          <p:cNvPr id="3" name="Notes Placeholder 2"/>
+          <p:cNvSpPr>
+            <a:spLocks noGrp="1"/>
+          </p:cNvSpPr>
+          <p:nvPr>
+            <p:ph type="body" idx="1"/>
+          </p:nvPr>
+        </p:nvSpPr>
+        <p:spPr/>
+        <p:txBody>
+          <a:bodyPr/>
+          <a:lstStyle/>
+          <a:p>
+            <a:endParaRPr lang="de-DE"/>
+          </a:p>
+        </p:txBody>
+      </p:sp>
+      <p:sp>
+        <p:nvSpPr>
+          <p:cNvPr id="4" name="Slide Number Placeholder 3"/>
+          <p:cNvSpPr>
+            <a:spLocks noGrp="1"/>
+          </p:cNvSpPr>
+          <p:nvPr>
+            <p:ph type="sldNum" sz="quarter" idx="10"/>
+          </p:nvPr>
+        </p:nvSpPr>
+        <p:spPr/>
+        <p:txBody>
+          <a:bodyPr/>
+          <a:lstStyle/>
+          <a:p>
+            <a:fld id="{D846DCDD-C48E-4755-8310-45DFD4650B4A}" type="slidenum">
+              <a:rPr lang="de-DE" smtClean="0"/>
+              <a:t>5</a:t>
+            </a:fld>
+            <a:endParaRPr lang="de-DE"/>
+          </a:p>
+        </p:txBody>
+      </p:sp>
+    </p:spTree>
+    <p:extLst>
+      <p:ext uri="{BB962C8B-B14F-4D97-AF65-F5344CB8AC3E}">
+        <p14:creationId xmlns:p14="http://schemas.microsoft.com/office/powerpoint/2010/main" val="1129394039"/>
+      </p:ext>
+    </p:extLst>
+  </p:cSld>
+  <p:clrMapOvr>
+    <a:masterClrMapping/>
+  </p:clrMapOvr>
+</p:notes>
+</file>
+
+<file path=ppt/notesSlides/notesSlide6.xml><?xml version="1.0" encoding="utf-8"?>
+<p:notes xmlns:a="http://schemas.openxmlformats.org/drawingml/2006/main" xmlns:r="http://schemas.openxmlformats.org/officeDocument/2006/relationships" xmlns:p="http://schemas.openxmlformats.org/presentationml/2006/main">
+  <p:cSld>
+    <p:spTree>
+      <p:nvGrpSpPr>
+        <p:cNvPr id="1" name=""/>
+        <p:cNvGrpSpPr/>
+        <p:nvPr/>
+      </p:nvGrpSpPr>
+      <p:grpSpPr>
+        <a:xfrm>
+          <a:off x="0" y="0"/>
+          <a:ext cx="0" cy="0"/>
+          <a:chOff x="0" y="0"/>
+          <a:chExt cx="0" cy="0"/>
+        </a:xfrm>
+      </p:grpSpPr>
+      <p:sp>
+        <p:nvSpPr>
+          <p:cNvPr id="2" name="Slide Image Placeholder 1"/>
+          <p:cNvSpPr>
+            <a:spLocks noGrp="1" noRot="1" noChangeAspect="1"/>
+          </p:cNvSpPr>
+          <p:nvPr>
+            <p:ph type="sldImg"/>
+          </p:nvPr>
+        </p:nvSpPr>
+        <p:spPr/>
+      </p:sp>
+      <p:sp>
+        <p:nvSpPr>
+          <p:cNvPr id="3" name="Notes Placeholder 2"/>
+          <p:cNvSpPr>
+            <a:spLocks noGrp="1"/>
+          </p:cNvSpPr>
+          <p:nvPr>
+            <p:ph type="body" idx="1"/>
+          </p:nvPr>
+        </p:nvSpPr>
+        <p:spPr/>
+        <p:txBody>
+          <a:bodyPr/>
+          <a:lstStyle/>
+          <a:p>
+            <a:endParaRPr lang="de-DE"/>
+          </a:p>
+        </p:txBody>
+      </p:sp>
+      <p:sp>
+        <p:nvSpPr>
+          <p:cNvPr id="4" name="Slide Number Placeholder 3"/>
+          <p:cNvSpPr>
+            <a:spLocks noGrp="1"/>
+          </p:cNvSpPr>
+          <p:nvPr>
+            <p:ph type="sldNum" sz="quarter" idx="10"/>
+          </p:nvPr>
+        </p:nvSpPr>
+        <p:spPr/>
+        <p:txBody>
+          <a:bodyPr/>
+          <a:lstStyle/>
+          <a:p>
+            <a:fld id="{D846DCDD-C48E-4755-8310-45DFD4650B4A}" type="slidenum">
+              <a:rPr lang="de-DE" smtClean="0"/>
+              <a:t>6</a:t>
+            </a:fld>
+            <a:endParaRPr lang="de-DE"/>
+          </a:p>
+        </p:txBody>
+      </p:sp>
+    </p:spTree>
+    <p:extLst>
+      <p:ext uri="{BB962C8B-B14F-4D97-AF65-F5344CB8AC3E}">
+        <p14:creationId xmlns:p14="http://schemas.microsoft.com/office/powerpoint/2010/main" val="2185089603"/>
+      </p:ext>
+    </p:extLst>
+  </p:cSld>
+  <p:clrMapOvr>
+    <a:masterClrMapping/>
+  </p:clrMapOvr>
+</p:notes>
+</file>
+
+<file path=ppt/notesSlides/notesSlide7.xml><?xml version="1.0" encoding="utf-8"?>
+<p:notes xmlns:a="http://schemas.openxmlformats.org/drawingml/2006/main" xmlns:r="http://schemas.openxmlformats.org/officeDocument/2006/relationships" xmlns:p="http://schemas.openxmlformats.org/presentationml/2006/main">
+  <p:cSld>
+    <p:spTree>
+      <p:nvGrpSpPr>
+        <p:cNvPr id="1" name=""/>
+        <p:cNvGrpSpPr/>
+        <p:nvPr/>
+      </p:nvGrpSpPr>
+      <p:grpSpPr>
+        <a:xfrm>
+          <a:off x="0" y="0"/>
+          <a:ext cx="0" cy="0"/>
+          <a:chOff x="0" y="0"/>
+          <a:chExt cx="0" cy="0"/>
+        </a:xfrm>
+      </p:grpSpPr>
+      <p:sp>
+        <p:nvSpPr>
+          <p:cNvPr id="2" name="Slide Image Placeholder 1"/>
+          <p:cNvSpPr>
+            <a:spLocks noGrp="1" noRot="1" noChangeAspect="1"/>
+          </p:cNvSpPr>
+          <p:nvPr>
+            <p:ph type="sldImg"/>
+          </p:nvPr>
+        </p:nvSpPr>
+        <p:spPr/>
+      </p:sp>
+      <p:sp>
+        <p:nvSpPr>
+          <p:cNvPr id="3" name="Notes Placeholder 2"/>
+          <p:cNvSpPr>
+            <a:spLocks noGrp="1"/>
+          </p:cNvSpPr>
+          <p:nvPr>
+            <p:ph type="body" idx="1"/>
+          </p:nvPr>
+        </p:nvSpPr>
+        <p:spPr/>
+        <p:txBody>
+          <a:bodyPr/>
+          <a:lstStyle/>
+          <a:p>
+            <a:endParaRPr lang="de-DE"/>
+          </a:p>
+        </p:txBody>
+      </p:sp>
+      <p:sp>
+        <p:nvSpPr>
+          <p:cNvPr id="4" name="Slide Number Placeholder 3"/>
+          <p:cNvSpPr>
+            <a:spLocks noGrp="1"/>
+          </p:cNvSpPr>
+          <p:nvPr>
+            <p:ph type="sldNum" sz="quarter" idx="10"/>
+          </p:nvPr>
+        </p:nvSpPr>
+        <p:spPr/>
+        <p:txBody>
+          <a:bodyPr/>
+          <a:lstStyle/>
+          <a:p>
+            <a:fld id="{D846DCDD-C48E-4755-8310-45DFD4650B4A}" type="slidenum">
+              <a:rPr lang="de-DE" smtClean="0"/>
+              <a:t>7</a:t>
+            </a:fld>
+            <a:endParaRPr lang="de-DE"/>
+          </a:p>
+        </p:txBody>
+      </p:sp>
+    </p:spTree>
+    <p:extLst>
+      <p:ext uri="{BB962C8B-B14F-4D97-AF65-F5344CB8AC3E}">
+        <p14:creationId xmlns:p14="http://schemas.microsoft.com/office/powerpoint/2010/main" val="167878121"/>
+      </p:ext>
+    </p:extLst>
+  </p:cSld>
+  <p:clrMapOvr>
+    <a:masterClrMapping/>
+  </p:clrMapOvr>
+</p:notes>
+</file>
+
+<file path=ppt/notesSlides/notesSlide8.xml><?xml version="1.0" encoding="utf-8"?>
+<p:notes xmlns:a="http://schemas.openxmlformats.org/drawingml/2006/main" xmlns:r="http://schemas.openxmlformats.org/officeDocument/2006/relationships" xmlns:p="http://schemas.openxmlformats.org/presentationml/2006/main">
+  <p:cSld>
+    <p:spTree>
+      <p:nvGrpSpPr>
+        <p:cNvPr id="1" name=""/>
+        <p:cNvGrpSpPr/>
+        <p:nvPr/>
+      </p:nvGrpSpPr>
+      <p:grpSpPr>
+        <a:xfrm>
+          <a:off x="0" y="0"/>
+          <a:ext cx="0" cy="0"/>
+          <a:chOff x="0" y="0"/>
+          <a:chExt cx="0" cy="0"/>
+        </a:xfrm>
+      </p:grpSpPr>
+      <p:sp>
+        <p:nvSpPr>
+          <p:cNvPr id="2" name="Slide Image Placeholder 1"/>
+          <p:cNvSpPr>
+            <a:spLocks noGrp="1" noRot="1" noChangeAspect="1"/>
+          </p:cNvSpPr>
+          <p:nvPr>
+            <p:ph type="sldImg"/>
+          </p:nvPr>
+        </p:nvSpPr>
+        <p:spPr/>
+      </p:sp>
+      <p:sp>
+        <p:nvSpPr>
+          <p:cNvPr id="3" name="Notes Placeholder 2"/>
+          <p:cNvSpPr>
+            <a:spLocks noGrp="1"/>
+          </p:cNvSpPr>
+          <p:nvPr>
+            <p:ph type="body" idx="1"/>
+          </p:nvPr>
+        </p:nvSpPr>
+        <p:spPr/>
+        <p:txBody>
+          <a:bodyPr/>
+          <a:lstStyle/>
+          <a:p>
+            <a:endParaRPr lang="de-DE"/>
+          </a:p>
+        </p:txBody>
+      </p:sp>
+      <p:sp>
+        <p:nvSpPr>
+          <p:cNvPr id="4" name="Slide Number Placeholder 3"/>
+          <p:cNvSpPr>
+            <a:spLocks noGrp="1"/>
+          </p:cNvSpPr>
+          <p:nvPr>
+            <p:ph type="sldNum" sz="quarter" idx="10"/>
+          </p:nvPr>
+        </p:nvSpPr>
+        <p:spPr/>
+        <p:txBody>
+          <a:bodyPr/>
+          <a:lstStyle/>
+          <a:p>
+            <a:fld id="{D846DCDD-C48E-4755-8310-45DFD4650B4A}" type="slidenum">
+              <a:rPr lang="de-DE" smtClean="0"/>
+              <a:t>8</a:t>
+            </a:fld>
+            <a:endParaRPr lang="de-DE"/>
+          </a:p>
+        </p:txBody>
+      </p:sp>
+    </p:spTree>
+    <p:extLst>
+      <p:ext uri="{BB962C8B-B14F-4D97-AF65-F5344CB8AC3E}">
+        <p14:creationId xmlns:p14="http://schemas.microsoft.com/office/powerpoint/2010/main" val="2561913655"/>
+      </p:ext>
+    </p:extLst>
+  </p:cSld>
+  <p:clrMapOvr>
+    <a:masterClrMapping/>
+  </p:clrMapOvr>
+</p:notes>
+</file>
+
+<file path=ppt/notesSlides/notesSlide9.xml><?xml version="1.0" encoding="utf-8"?>
+<p:notes xmlns:a="http://schemas.openxmlformats.org/drawingml/2006/main" xmlns:r="http://schemas.openxmlformats.org/officeDocument/2006/relationships" xmlns:p="http://schemas.openxmlformats.org/presentationml/2006/main">
+  <p:cSld>
+    <p:spTree>
+      <p:nvGrpSpPr>
+        <p:cNvPr id="1" name=""/>
+        <p:cNvGrpSpPr/>
+        <p:nvPr/>
+      </p:nvGrpSpPr>
+      <p:grpSpPr>
+        <a:xfrm>
+          <a:off x="0" y="0"/>
+          <a:ext cx="0" cy="0"/>
+          <a:chOff x="0" y="0"/>
+          <a:chExt cx="0" cy="0"/>
+        </a:xfrm>
+      </p:grpSpPr>
+      <p:sp>
+        <p:nvSpPr>
+          <p:cNvPr id="2" name="Slide Image Placeholder 1"/>
+          <p:cNvSpPr>
+            <a:spLocks noGrp="1" noRot="1" noChangeAspect="1"/>
+          </p:cNvSpPr>
+          <p:nvPr>
+            <p:ph type="sldImg"/>
+          </p:nvPr>
+        </p:nvSpPr>
+        <p:spPr/>
+      </p:sp>
+      <p:sp>
+        <p:nvSpPr>
+          <p:cNvPr id="3" name="Notes Placeholder 2"/>
+          <p:cNvSpPr>
+            <a:spLocks noGrp="1"/>
+          </p:cNvSpPr>
+          <p:nvPr>
+            <p:ph type="body" idx="1"/>
+          </p:nvPr>
+        </p:nvSpPr>
+        <p:spPr/>
+        <p:txBody>
+          <a:bodyPr/>
+          <a:lstStyle/>
+          <a:p>
+            <a:endParaRPr lang="de-DE"/>
+          </a:p>
+        </p:txBody>
+      </p:sp>
+      <p:sp>
+        <p:nvSpPr>
+          <p:cNvPr id="4" name="Slide Number Placeholder 3"/>
+          <p:cNvSpPr>
+            <a:spLocks noGrp="1"/>
+          </p:cNvSpPr>
+          <p:nvPr>
+            <p:ph type="sldNum" sz="quarter" idx="10"/>
+          </p:nvPr>
+        </p:nvSpPr>
+        <p:spPr/>
+        <p:txBody>
+          <a:bodyPr/>
+          <a:lstStyle/>
+          <a:p>
+            <a:fld id="{D846DCDD-C48E-4755-8310-45DFD4650B4A}" type="slidenum">
+              <a:rPr lang="de-DE" smtClean="0"/>
+              <a:t>9</a:t>
+            </a:fld>
+            <a:endParaRPr lang="de-DE"/>
+          </a:p>
+        </p:txBody>
+      </p:sp>
+    </p:spTree>
+    <p:extLst>
+      <p:ext uri="{BB962C8B-B14F-4D97-AF65-F5344CB8AC3E}">
+        <p14:creationId xmlns:p14="http://schemas.microsoft.com/office/powerpoint/2010/main" val="3054591893"/>
+      </p:ext>
+    </p:extLst>
+  </p:cSld>
+  <p:clrMapOvr>
+    <a:masterClrMapping/>
+  </p:clrMapOvr>
+</p:notes>
 </file>
 
 <file path=ppt/slideLayouts/slideLayout1.xml><?xml version="1.0" encoding="utf-8"?>
@@ -3249,6 +4448,385 @@
 </p:sld>
 </file>
 
+<file path=ppt/slides/slide10.xml><?xml version="1.0" encoding="utf-8"?>
+<p:sld xmlns:a="http://schemas.openxmlformats.org/drawingml/2006/main" xmlns:r="http://schemas.openxmlformats.org/officeDocument/2006/relationships" xmlns:p="http://schemas.openxmlformats.org/presentationml/2006/main">
+  <p:cSld>
+    <p:spTree>
+      <p:nvGrpSpPr>
+        <p:cNvPr id="1" name=""/>
+        <p:cNvGrpSpPr/>
+        <p:nvPr/>
+      </p:nvGrpSpPr>
+      <p:grpSpPr>
+        <a:xfrm>
+          <a:off x="0" y="0"/>
+          <a:ext cx="0" cy="0"/>
+          <a:chOff x="0" y="0"/>
+          <a:chExt cx="0" cy="0"/>
+        </a:xfrm>
+      </p:grpSpPr>
+      <p:sp>
+        <p:nvSpPr>
+          <p:cNvPr id="5" name="TextBox 4"/>
+          <p:cNvSpPr txBox="1"/>
+          <p:nvPr/>
+        </p:nvSpPr>
+        <p:spPr>
+          <a:xfrm flipH="1">
+            <a:off x="4626797" y="2579169"/>
+            <a:ext cx="428625" cy="707886"/>
+          </a:xfrm>
+          <a:prstGeom prst="rect">
+            <a:avLst/>
+          </a:prstGeom>
+          <a:noFill/>
+        </p:spPr>
+        <p:txBody>
+          <a:bodyPr wrap="square" rIns="0" rtlCol="0">
+            <a:spAutoFit/>
+          </a:bodyPr>
+          <a:lstStyle/>
+          <a:p>
+            <a:r>
+              <a:rPr lang="de-DE" sz="4000" dirty="0" smtClean="0">
+                <a:ln w="0"/>
+                <a:solidFill>
+                  <a:schemeClr val="tx1">
+                    <a:lumMod val="75000"/>
+                    <a:lumOff val="25000"/>
+                  </a:schemeClr>
+                </a:solidFill>
+                <a:effectLst/>
+              </a:rPr>
+              <a:t>≡</a:t>
+            </a:r>
+            <a:endParaRPr lang="de-DE" sz="4000" dirty="0">
+              <a:effectLst/>
+            </a:endParaRPr>
+          </a:p>
+        </p:txBody>
+      </p:sp>
+      <p:sp>
+        <p:nvSpPr>
+          <p:cNvPr id="6" name="TextBox 5"/>
+          <p:cNvSpPr txBox="1"/>
+          <p:nvPr/>
+        </p:nvSpPr>
+        <p:spPr>
+          <a:xfrm>
+            <a:off x="4225915" y="2579169"/>
+            <a:ext cx="342401" cy="615553"/>
+          </a:xfrm>
+          <a:prstGeom prst="rect">
+            <a:avLst/>
+          </a:prstGeom>
+          <a:noFill/>
+        </p:spPr>
+        <p:txBody>
+          <a:bodyPr wrap="none" tIns="0" rIns="0" bIns="0" rtlCol="0">
+            <a:spAutoFit/>
+          </a:bodyPr>
+          <a:lstStyle/>
+          <a:p>
+            <a:r>
+              <a:rPr lang="de-DE" sz="4000" dirty="0" smtClean="0">
+                <a:ln w="0"/>
+                <a:solidFill>
+                  <a:schemeClr val="tx1">
+                    <a:lumMod val="75000"/>
+                    <a:lumOff val="25000"/>
+                  </a:schemeClr>
+                </a:solidFill>
+              </a:rPr>
+              <a:t>T</a:t>
+            </a:r>
+            <a:endParaRPr lang="de-DE" sz="4000" dirty="0">
+              <a:ln w="0"/>
+              <a:solidFill>
+                <a:schemeClr val="tx1">
+                  <a:lumMod val="75000"/>
+                  <a:lumOff val="25000"/>
+                </a:schemeClr>
+              </a:solidFill>
+              <a:effectLst/>
+            </a:endParaRPr>
+          </a:p>
+        </p:txBody>
+      </p:sp>
+      <p:sp>
+        <p:nvSpPr>
+          <p:cNvPr id="7" name="TextBox 6"/>
+          <p:cNvSpPr txBox="1"/>
+          <p:nvPr/>
+        </p:nvSpPr>
+        <p:spPr>
+          <a:xfrm>
+            <a:off x="4428374" y="2702279"/>
+            <a:ext cx="279885" cy="461665"/>
+          </a:xfrm>
+          <a:prstGeom prst="rect">
+            <a:avLst/>
+          </a:prstGeom>
+          <a:noFill/>
+        </p:spPr>
+        <p:txBody>
+          <a:bodyPr wrap="none" tIns="0" rIns="0" bIns="0" rtlCol="0">
+            <a:spAutoFit/>
+          </a:bodyPr>
+          <a:lstStyle/>
+          <a:p>
+            <a:r>
+              <a:rPr lang="de-DE" sz="3000" dirty="0">
+                <a:ln w="0"/>
+                <a:solidFill>
+                  <a:schemeClr val="tx1">
+                    <a:lumMod val="75000"/>
+                    <a:lumOff val="25000"/>
+                  </a:schemeClr>
+                </a:solidFill>
+              </a:rPr>
+              <a:t>T</a:t>
+            </a:r>
+            <a:endParaRPr lang="de-DE" sz="3000" dirty="0" smtClean="0">
+              <a:ln w="0"/>
+              <a:solidFill>
+                <a:schemeClr val="tx1">
+                  <a:lumMod val="75000"/>
+                  <a:lumOff val="25000"/>
+                </a:schemeClr>
+              </a:solidFill>
+            </a:endParaRPr>
+          </a:p>
+        </p:txBody>
+      </p:sp>
+    </p:spTree>
+    <p:extLst>
+      <p:ext uri="{BB962C8B-B14F-4D97-AF65-F5344CB8AC3E}">
+        <p14:creationId xmlns:p14="http://schemas.microsoft.com/office/powerpoint/2010/main" val="3872272965"/>
+      </p:ext>
+    </p:extLst>
+  </p:cSld>
+  <p:clrMapOvr>
+    <a:masterClrMapping/>
+  </p:clrMapOvr>
+  <p:timing>
+    <p:tnLst>
+      <p:par>
+        <p:cTn id="1" dur="indefinite" restart="never" nodeType="tmRoot"/>
+      </p:par>
+    </p:tnLst>
+  </p:timing>
+</p:sld>
+</file>
+
+<file path=ppt/slides/slide11.xml><?xml version="1.0" encoding="utf-8"?>
+<p:sld xmlns:a="http://schemas.openxmlformats.org/drawingml/2006/main" xmlns:r="http://schemas.openxmlformats.org/officeDocument/2006/relationships" xmlns:p="http://schemas.openxmlformats.org/presentationml/2006/main">
+  <p:cSld>
+    <p:spTree>
+      <p:nvGrpSpPr>
+        <p:cNvPr id="1" name=""/>
+        <p:cNvGrpSpPr/>
+        <p:nvPr/>
+      </p:nvGrpSpPr>
+      <p:grpSpPr>
+        <a:xfrm>
+          <a:off x="0" y="0"/>
+          <a:ext cx="0" cy="0"/>
+          <a:chOff x="0" y="0"/>
+          <a:chExt cx="0" cy="0"/>
+        </a:xfrm>
+      </p:grpSpPr>
+      <p:sp>
+        <p:nvSpPr>
+          <p:cNvPr id="2" name="TextBox 1"/>
+          <p:cNvSpPr txBox="1"/>
+          <p:nvPr/>
+        </p:nvSpPr>
+        <p:spPr>
+          <a:xfrm>
+            <a:off x="4857741" y="3161415"/>
+            <a:ext cx="342401" cy="615553"/>
+          </a:xfrm>
+          <a:prstGeom prst="rect">
+            <a:avLst/>
+          </a:prstGeom>
+          <a:noFill/>
+        </p:spPr>
+        <p:txBody>
+          <a:bodyPr wrap="none" tIns="0" rIns="0" bIns="0" rtlCol="0">
+            <a:spAutoFit/>
+          </a:bodyPr>
+          <a:lstStyle/>
+          <a:p>
+            <a:r>
+              <a:rPr lang="de-DE" sz="4000" dirty="0" smtClean="0">
+                <a:ln w="0"/>
+                <a:solidFill>
+                  <a:schemeClr val="tx1">
+                    <a:lumMod val="75000"/>
+                    <a:lumOff val="25000"/>
+                  </a:schemeClr>
+                </a:solidFill>
+              </a:rPr>
+              <a:t>T</a:t>
+            </a:r>
+            <a:endParaRPr lang="de-DE" sz="4000" dirty="0">
+              <a:ln w="0"/>
+              <a:solidFill>
+                <a:schemeClr val="tx1">
+                  <a:lumMod val="75000"/>
+                  <a:lumOff val="25000"/>
+                </a:schemeClr>
+              </a:solidFill>
+              <a:effectLst/>
+            </a:endParaRPr>
+          </a:p>
+        </p:txBody>
+      </p:sp>
+      <p:sp>
+        <p:nvSpPr>
+          <p:cNvPr id="3" name="TextBox 2"/>
+          <p:cNvSpPr txBox="1"/>
+          <p:nvPr/>
+        </p:nvSpPr>
+        <p:spPr>
+          <a:xfrm>
+            <a:off x="5060199" y="3289360"/>
+            <a:ext cx="279885" cy="461665"/>
+          </a:xfrm>
+          <a:prstGeom prst="rect">
+            <a:avLst/>
+          </a:prstGeom>
+          <a:noFill/>
+        </p:spPr>
+        <p:txBody>
+          <a:bodyPr wrap="none" tIns="0" rIns="0" bIns="0" rtlCol="0">
+            <a:spAutoFit/>
+          </a:bodyPr>
+          <a:lstStyle/>
+          <a:p>
+            <a:r>
+              <a:rPr lang="de-DE" sz="3000" dirty="0">
+                <a:ln w="0"/>
+                <a:solidFill>
+                  <a:schemeClr val="tx1">
+                    <a:lumMod val="75000"/>
+                    <a:lumOff val="25000"/>
+                  </a:schemeClr>
+                </a:solidFill>
+              </a:rPr>
+              <a:t>T</a:t>
+            </a:r>
+            <a:endParaRPr lang="de-DE" sz="3000" dirty="0" smtClean="0">
+              <a:ln w="0"/>
+              <a:solidFill>
+                <a:schemeClr val="tx1">
+                  <a:lumMod val="75000"/>
+                  <a:lumOff val="25000"/>
+                </a:schemeClr>
+              </a:solidFill>
+            </a:endParaRPr>
+          </a:p>
+        </p:txBody>
+      </p:sp>
+    </p:spTree>
+    <p:extLst>
+      <p:ext uri="{BB962C8B-B14F-4D97-AF65-F5344CB8AC3E}">
+        <p14:creationId xmlns:p14="http://schemas.microsoft.com/office/powerpoint/2010/main" val="3208127879"/>
+      </p:ext>
+    </p:extLst>
+  </p:cSld>
+  <p:clrMapOvr>
+    <a:masterClrMapping/>
+  </p:clrMapOvr>
+  <p:timing>
+    <p:tnLst>
+      <p:par>
+        <p:cTn id="1" dur="indefinite" restart="never" nodeType="tmRoot"/>
+      </p:par>
+    </p:tnLst>
+  </p:timing>
+</p:sld>
+</file>
+
+<file path=ppt/slides/slide12.xml><?xml version="1.0" encoding="utf-8"?>
+<p:sld xmlns:a="http://schemas.openxmlformats.org/drawingml/2006/main" xmlns:r="http://schemas.openxmlformats.org/officeDocument/2006/relationships" xmlns:p="http://schemas.openxmlformats.org/presentationml/2006/main">
+  <p:cSld>
+    <p:spTree>
+      <p:nvGrpSpPr>
+        <p:cNvPr id="1" name=""/>
+        <p:cNvGrpSpPr/>
+        <p:nvPr/>
+      </p:nvGrpSpPr>
+      <p:grpSpPr>
+        <a:xfrm>
+          <a:off x="0" y="0"/>
+          <a:ext cx="0" cy="0"/>
+          <a:chOff x="0" y="0"/>
+          <a:chExt cx="0" cy="0"/>
+        </a:xfrm>
+      </p:grpSpPr>
+      <p:sp>
+        <p:nvSpPr>
+          <p:cNvPr id="2" name="TextBox 1"/>
+          <p:cNvSpPr txBox="1"/>
+          <p:nvPr/>
+        </p:nvSpPr>
+        <p:spPr>
+          <a:xfrm flipH="1">
+            <a:off x="4626797" y="2579169"/>
+            <a:ext cx="428625" cy="707886"/>
+          </a:xfrm>
+          <a:prstGeom prst="rect">
+            <a:avLst/>
+          </a:prstGeom>
+          <a:noFill/>
+        </p:spPr>
+        <p:txBody>
+          <a:bodyPr wrap="square" rIns="0" rtlCol="0">
+            <a:spAutoFit/>
+          </a:bodyPr>
+          <a:lstStyle/>
+          <a:p>
+            <a:r>
+              <a:rPr lang="de-DE" sz="4000" dirty="0" smtClean="0">
+                <a:ln w="0"/>
+                <a:solidFill>
+                  <a:schemeClr val="tx1">
+                    <a:lumMod val="75000"/>
+                    <a:lumOff val="25000"/>
+                  </a:schemeClr>
+                </a:solidFill>
+                <a:effectLst/>
+              </a:rPr>
+              <a:t>≡</a:t>
+            </a:r>
+            <a:endParaRPr lang="de-DE" sz="4000" dirty="0">
+              <a:effectLst/>
+            </a:endParaRPr>
+          </a:p>
+        </p:txBody>
+      </p:sp>
+    </p:spTree>
+    <p:extLst>
+      <p:ext uri="{BB962C8B-B14F-4D97-AF65-F5344CB8AC3E}">
+        <p14:creationId xmlns:p14="http://schemas.microsoft.com/office/powerpoint/2010/main" val="1111412075"/>
+      </p:ext>
+    </p:extLst>
+  </p:cSld>
+  <p:clrMapOvr>
+    <a:masterClrMapping/>
+  </p:clrMapOvr>
+  <p:timing>
+    <p:tnLst>
+      <p:par>
+        <p:cTn id="1" dur="indefinite" restart="never" nodeType="tmRoot"/>
+      </p:par>
+    </p:tnLst>
+  </p:timing>
+</p:sld>
+</file>
+
 <file path=ppt/slides/slide2.xml><?xml version="1.0" encoding="utf-8"?>
 <p:sld xmlns:a="http://schemas.openxmlformats.org/drawingml/2006/main" xmlns:r="http://schemas.openxmlformats.org/officeDocument/2006/relationships" xmlns:p="http://schemas.openxmlformats.org/presentationml/2006/main">
   <p:cSld>
@@ -7131,7 +8709,7 @@
           <p:nvPr/>
         </p:nvPicPr>
         <p:blipFill>
-          <a:blip r:embed="rId2" cstate="print">
+          <a:blip r:embed="rId3" cstate="print">
             <a:extLst>
               <a:ext uri="{28A0092B-C50C-407E-A947-70E740481C1C}">
                 <a14:useLocalDpi xmlns:a14="http://schemas.microsoft.com/office/drawing/2010/main" val="0"/>
@@ -7320,15 +8898,52 @@
           </a:p>
         </p:txBody>
       </p:sp>
-      <p:sp>
-        <p:nvSpPr>
-          <p:cNvPr id="5" name="TextBox 4"/>
+    </p:spTree>
+    <p:extLst>
+      <p:ext uri="{BB962C8B-B14F-4D97-AF65-F5344CB8AC3E}">
+        <p14:creationId xmlns:p14="http://schemas.microsoft.com/office/powerpoint/2010/main" val="3425945009"/>
+      </p:ext>
+    </p:extLst>
+  </p:cSld>
+  <p:clrMapOvr>
+    <a:masterClrMapping/>
+  </p:clrMapOvr>
+  <p:timing>
+    <p:tnLst>
+      <p:par>
+        <p:cTn id="1" dur="indefinite" restart="never" nodeType="tmRoot"/>
+      </p:par>
+    </p:tnLst>
+  </p:timing>
+</p:sld>
+</file>
+
+<file path=ppt/slides/slide7.xml><?xml version="1.0" encoding="utf-8"?>
+<p:sld xmlns:a="http://schemas.openxmlformats.org/drawingml/2006/main" xmlns:r="http://schemas.openxmlformats.org/officeDocument/2006/relationships" xmlns:p="http://schemas.openxmlformats.org/presentationml/2006/main">
+  <p:cSld>
+    <p:spTree>
+      <p:nvGrpSpPr>
+        <p:cNvPr id="1" name=""/>
+        <p:cNvGrpSpPr/>
+        <p:nvPr/>
+      </p:nvGrpSpPr>
+      <p:grpSpPr>
+        <a:xfrm>
+          <a:off x="0" y="0"/>
+          <a:ext cx="0" cy="0"/>
+          <a:chOff x="0" y="0"/>
+          <a:chExt cx="0" cy="0"/>
+        </a:xfrm>
+      </p:grpSpPr>
+      <p:sp>
+        <p:nvSpPr>
+          <p:cNvPr id="2" name="TextBox 1"/>
           <p:cNvSpPr txBox="1"/>
           <p:nvPr/>
         </p:nvSpPr>
         <p:spPr>
           <a:xfrm>
-            <a:off x="8417808" y="4557500"/>
+            <a:off x="5311193" y="3008191"/>
             <a:ext cx="413578" cy="707886"/>
           </a:xfrm>
           <a:prstGeom prst="rect">
@@ -7363,13 +8978,139 @@
       </p:sp>
       <p:sp>
         <p:nvSpPr>
-          <p:cNvPr id="6" name="TextBox 5"/>
+          <p:cNvPr id="3" name="TextBox 2"/>
           <p:cNvSpPr txBox="1"/>
           <p:nvPr/>
         </p:nvSpPr>
         <p:spPr>
           <a:xfrm>
-            <a:off x="8230446" y="4556768"/>
+            <a:off x="4966293" y="3008191"/>
+            <a:ext cx="428131" cy="615553"/>
+          </a:xfrm>
+          <a:prstGeom prst="rect">
+            <a:avLst/>
+          </a:prstGeom>
+          <a:noFill/>
+        </p:spPr>
+        <p:txBody>
+          <a:bodyPr wrap="none" tIns="0" rIns="0" bIns="0" rtlCol="0">
+            <a:spAutoFit/>
+          </a:bodyPr>
+          <a:lstStyle/>
+          <a:p>
+            <a:r>
+              <a:rPr lang="de-DE" sz="4000" dirty="0" err="1" smtClean="0">
+                <a:ln w="0"/>
+                <a:solidFill>
+                  <a:schemeClr val="tx1">
+                    <a:lumMod val="75000"/>
+                    <a:lumOff val="25000"/>
+                  </a:schemeClr>
+                </a:solidFill>
+                <a:effectLst/>
+              </a:rPr>
+              <a:t>tt</a:t>
+            </a:r>
+            <a:endParaRPr lang="de-DE" sz="4000" dirty="0">
+              <a:ln w="0"/>
+              <a:solidFill>
+                <a:schemeClr val="tx1">
+                  <a:lumMod val="75000"/>
+                  <a:lumOff val="25000"/>
+                </a:schemeClr>
+              </a:solidFill>
+              <a:effectLst/>
+            </a:endParaRPr>
+          </a:p>
+        </p:txBody>
+      </p:sp>
+    </p:spTree>
+    <p:extLst>
+      <p:ext uri="{BB962C8B-B14F-4D97-AF65-F5344CB8AC3E}">
+        <p14:creationId xmlns:p14="http://schemas.microsoft.com/office/powerpoint/2010/main" val="3826784307"/>
+      </p:ext>
+    </p:extLst>
+  </p:cSld>
+  <p:clrMapOvr>
+    <a:masterClrMapping/>
+  </p:clrMapOvr>
+  <p:timing>
+    <p:tnLst>
+      <p:par>
+        <p:cTn id="1" dur="indefinite" restart="never" nodeType="tmRoot"/>
+      </p:par>
+    </p:tnLst>
+  </p:timing>
+</p:sld>
+</file>
+
+<file path=ppt/slides/slide8.xml><?xml version="1.0" encoding="utf-8"?>
+<p:sld xmlns:a="http://schemas.openxmlformats.org/drawingml/2006/main" xmlns:r="http://schemas.openxmlformats.org/officeDocument/2006/relationships" xmlns:p="http://schemas.openxmlformats.org/presentationml/2006/main">
+  <p:cSld>
+    <p:spTree>
+      <p:nvGrpSpPr>
+        <p:cNvPr id="1" name=""/>
+        <p:cNvGrpSpPr/>
+        <p:nvPr/>
+      </p:nvGrpSpPr>
+      <p:grpSpPr>
+        <a:xfrm>
+          <a:off x="0" y="0"/>
+          <a:ext cx="0" cy="0"/>
+          <a:chOff x="0" y="0"/>
+          <a:chExt cx="0" cy="0"/>
+        </a:xfrm>
+      </p:grpSpPr>
+      <p:sp>
+        <p:nvSpPr>
+          <p:cNvPr id="2" name="TextBox 1"/>
+          <p:cNvSpPr txBox="1"/>
+          <p:nvPr/>
+        </p:nvSpPr>
+        <p:spPr>
+          <a:xfrm>
+            <a:off x="4752393" y="2595838"/>
+            <a:ext cx="413578" cy="707886"/>
+          </a:xfrm>
+          <a:prstGeom prst="rect">
+            <a:avLst/>
+          </a:prstGeom>
+          <a:noFill/>
+        </p:spPr>
+        <p:txBody>
+          <a:bodyPr wrap="square" rIns="0" rtlCol="0">
+            <a:spAutoFit/>
+          </a:bodyPr>
+          <a:lstStyle/>
+          <a:p>
+            <a:r>
+              <a:rPr lang="de-DE" sz="4000" dirty="0" smtClean="0">
+                <a:ln w="0"/>
+                <a:solidFill>
+                  <a:schemeClr val="tx1">
+                    <a:lumMod val="75000"/>
+                    <a:lumOff val="25000"/>
+                  </a:schemeClr>
+                </a:solidFill>
+                <a:effectLst/>
+              </a:rPr>
+              <a:t>≡</a:t>
+            </a:r>
+            <a:endParaRPr lang="de-DE" sz="4000" dirty="0">
+              <a:effectLst/>
+            </a:endParaRPr>
+          </a:p>
+        </p:txBody>
+      </p:sp>
+      <p:sp>
+        <p:nvSpPr>
+          <p:cNvPr id="3" name="TextBox 2"/>
+          <p:cNvSpPr txBox="1"/>
+          <p:nvPr/>
+        </p:nvSpPr>
+        <p:spPr>
+          <a:xfrm>
+            <a:off x="4565031" y="2595106"/>
             <a:ext cx="263855" cy="615553"/>
           </a:xfrm>
           <a:prstGeom prst="rect">
@@ -7409,16 +9150,53 @@
           </a:p>
         </p:txBody>
       </p:sp>
-      <p:sp>
-        <p:nvSpPr>
-          <p:cNvPr id="7" name="TextBox 6"/>
+    </p:spTree>
+    <p:extLst>
+      <p:ext uri="{BB962C8B-B14F-4D97-AF65-F5344CB8AC3E}">
+        <p14:creationId xmlns:p14="http://schemas.microsoft.com/office/powerpoint/2010/main" val="2470498303"/>
+      </p:ext>
+    </p:extLst>
+  </p:cSld>
+  <p:clrMapOvr>
+    <a:masterClrMapping/>
+  </p:clrMapOvr>
+  <p:timing>
+    <p:tnLst>
+      <p:par>
+        <p:cTn id="1" dur="indefinite" restart="never" nodeType="tmRoot"/>
+      </p:par>
+    </p:tnLst>
+  </p:timing>
+</p:sld>
+</file>
+
+<file path=ppt/slides/slide9.xml><?xml version="1.0" encoding="utf-8"?>
+<p:sld xmlns:a="http://schemas.openxmlformats.org/drawingml/2006/main" xmlns:r="http://schemas.openxmlformats.org/officeDocument/2006/relationships" xmlns:p="http://schemas.openxmlformats.org/presentationml/2006/main">
+  <p:cSld>
+    <p:spTree>
+      <p:nvGrpSpPr>
+        <p:cNvPr id="1" name=""/>
+        <p:cNvGrpSpPr/>
+        <p:nvPr/>
+      </p:nvGrpSpPr>
+      <p:grpSpPr>
+        <a:xfrm>
+          <a:off x="0" y="0"/>
+          <a:ext cx="0" cy="0"/>
+          <a:chOff x="0" y="0"/>
+          <a:chExt cx="0" cy="0"/>
+        </a:xfrm>
+      </p:grpSpPr>
+      <p:sp>
+        <p:nvSpPr>
+          <p:cNvPr id="2" name="TextBox 1"/>
           <p:cNvSpPr txBox="1"/>
           <p:nvPr/>
         </p:nvSpPr>
         <p:spPr>
-          <a:xfrm>
-            <a:off x="6866454" y="5173053"/>
-            <a:ext cx="413578" cy="707886"/>
+          <a:xfrm flipH="1">
+            <a:off x="4762499" y="2579169"/>
+            <a:ext cx="428625" cy="707886"/>
           </a:xfrm>
           <a:prstGeom prst="rect">
             <a:avLst/>
@@ -7452,14 +9230,14 @@
       </p:sp>
       <p:sp>
         <p:nvSpPr>
-          <p:cNvPr id="8" name="TextBox 7"/>
+          <p:cNvPr id="3" name="TextBox 2"/>
           <p:cNvSpPr txBox="1"/>
           <p:nvPr/>
         </p:nvSpPr>
         <p:spPr>
           <a:xfrm>
-            <a:off x="6521554" y="5173053"/>
-            <a:ext cx="428131" cy="615553"/>
+            <a:off x="4507270" y="2595838"/>
+            <a:ext cx="342401" cy="615553"/>
           </a:xfrm>
           <a:prstGeom prst="rect">
             <a:avLst/>
@@ -7473,7 +9251,7 @@
           <a:lstStyle/>
           <a:p>
             <a:r>
-              <a:rPr lang="de-DE" sz="4000" dirty="0" err="1" smtClean="0">
+              <a:rPr lang="de-DE" sz="4000" dirty="0">
                 <a:ln w="0"/>
                 <a:solidFill>
                   <a:schemeClr val="tx1">
@@ -7481,9 +9259,8 @@
                     <a:lumOff val="25000"/>
                   </a:schemeClr>
                 </a:solidFill>
-                <a:effectLst/>
               </a:rPr>
-              <a:t>tt</a:t>
+              <a:t>T</a:t>
             </a:r>
             <a:endParaRPr lang="de-DE" sz="4000" dirty="0">
               <a:ln w="0"/>
@@ -7501,13 +9278,20 @@
     </p:spTree>
     <p:extLst>
       <p:ext uri="{BB962C8B-B14F-4D97-AF65-F5344CB8AC3E}">
-        <p14:creationId xmlns:p14="http://schemas.microsoft.com/office/powerpoint/2010/main" val="3425945009"/>
+        <p14:creationId xmlns:p14="http://schemas.microsoft.com/office/powerpoint/2010/main" val="1562623309"/>
       </p:ext>
     </p:extLst>
   </p:cSld>
   <p:clrMapOvr>
     <a:masterClrMapping/>
   </p:clrMapOvr>
+  <p:timing>
+    <p:tnLst>
+      <p:par>
+        <p:cTn id="1" dur="indefinite" restart="never" nodeType="tmRoot"/>
+      </p:par>
+    </p:tnLst>
+  </p:timing>
 </p:sld>
 </file>
 
@@ -7770,4 +9554,265 @@
     </a:ext>
   </a:extLst>
 </a:theme>
+</file>
+
+<file path=ppt/theme/theme2.xml><?xml version="1.0" encoding="utf-8"?>
+<a:theme xmlns:a="http://schemas.openxmlformats.org/drawingml/2006/main" name="Office Theme">
+  <a:themeElements>
+    <a:clrScheme name="Office">
+      <a:dk1>
+        <a:sysClr val="windowText" lastClr="000000"/>
+      </a:dk1>
+      <a:lt1>
+        <a:sysClr val="window" lastClr="FFFFFF"/>
+      </a:lt1>
+      <a:dk2>
+        <a:srgbClr val="44546A"/>
+      </a:dk2>
+      <a:lt2>
+        <a:srgbClr val="E7E6E6"/>
+      </a:lt2>
+      <a:accent1>
+        <a:srgbClr val="5B9BD5"/>
+      </a:accent1>
+      <a:accent2>
+        <a:srgbClr val="ED7D31"/>
+      </a:accent2>
+      <a:accent3>
+        <a:srgbClr val="A5A5A5"/>
+      </a:accent3>
+      <a:accent4>
+        <a:srgbClr val="FFC000"/>
+      </a:accent4>
+      <a:accent5>
+        <a:srgbClr val="4472C4"/>
+      </a:accent5>
+      <a:accent6>
+        <a:srgbClr val="70AD47"/>
+      </a:accent6>
+      <a:hlink>
+        <a:srgbClr val="0563C1"/>
+      </a:hlink>
+      <a:folHlink>
+        <a:srgbClr val="954F72"/>
+      </a:folHlink>
+    </a:clrScheme>
+    <a:fontScheme name="Office">
+      <a:majorFont>
+        <a:latin typeface="Calibri Light" panose="020F0302020204030204"/>
+        <a:ea typeface=""/>
+        <a:cs typeface=""/>
+        <a:font script="Jpan" typeface="ＭＳ Ｐゴシック"/>
+        <a:font script="Hang" typeface="맑은 고딕"/>
+        <a:font script="Hans" typeface="宋体"/>
+        <a:font script="Hant" typeface="新細明體"/>
+        <a:font script="Arab" typeface="Times New Roman"/>
+        <a:font script="Hebr" typeface="Times New Roman"/>
+        <a:font script="Thai" typeface="Angsana New"/>
+        <a:font script="Ethi" typeface="Nyala"/>
+        <a:font script="Beng" typeface="Vrinda"/>
+        <a:font script="Gujr" typeface="Shruti"/>
+        <a:font script="Khmr" typeface="MoolBoran"/>
+        <a:font script="Knda" typeface="Tunga"/>
+        <a:font script="Guru" typeface="Raavi"/>
+        <a:font script="Cans" typeface="Euphemia"/>
+        <a:font script="Cher" typeface="Plantagenet Cherokee"/>
+        <a:font script="Yiii" typeface="Microsoft Yi Baiti"/>
+        <a:font script="Tibt" typeface="Microsoft Himalaya"/>
+        <a:font script="Thaa" typeface="MV Boli"/>
+        <a:font script="Deva" typeface="Mangal"/>
+        <a:font script="Telu" typeface="Gautami"/>
+        <a:font script="Taml" typeface="Latha"/>
+        <a:font script="Syrc" typeface="Estrangelo Edessa"/>
+        <a:font script="Orya" typeface="Kalinga"/>
+        <a:font script="Mlym" typeface="Kartika"/>
+        <a:font script="Laoo" typeface="DokChampa"/>
+        <a:font script="Sinh" typeface="Iskoola Pota"/>
+        <a:font script="Mong" typeface="Mongolian Baiti"/>
+        <a:font script="Viet" typeface="Times New Roman"/>
+        <a:font script="Uigh" typeface="Microsoft Uighur"/>
+        <a:font script="Geor" typeface="Sylfaen"/>
+      </a:majorFont>
+      <a:minorFont>
+        <a:latin typeface="Calibri" panose="020F0502020204030204"/>
+        <a:ea typeface=""/>
+        <a:cs typeface=""/>
+        <a:font script="Jpan" typeface="ＭＳ Ｐゴシック"/>
+        <a:font script="Hang" typeface="맑은 고딕"/>
+        <a:font script="Hans" typeface="宋体"/>
+        <a:font script="Hant" typeface="新細明體"/>
+        <a:font script="Arab" typeface="Arial"/>
+        <a:font script="Hebr" typeface="Arial"/>
+        <a:font script="Thai" typeface="Cordia New"/>
+        <a:font script="Ethi" typeface="Nyala"/>
+        <a:font script="Beng" typeface="Vrinda"/>
+        <a:font script="Gujr" typeface="Shruti"/>
+        <a:font script="Khmr" typeface="DaunPenh"/>
+        <a:font script="Knda" typeface="Tunga"/>
+        <a:font script="Guru" typeface="Raavi"/>
+        <a:font script="Cans" typeface="Euphemia"/>
+        <a:font script="Cher" typeface="Plantagenet Cherokee"/>
+        <a:font script="Yiii" typeface="Microsoft Yi Baiti"/>
+        <a:font script="Tibt" typeface="Microsoft Himalaya"/>
+        <a:font script="Thaa" typeface="MV Boli"/>
+        <a:font script="Deva" typeface="Mangal"/>
+        <a:font script="Telu" typeface="Gautami"/>
+        <a:font script="Taml" typeface="Latha"/>
+        <a:font script="Syrc" typeface="Estrangelo Edessa"/>
+        <a:font script="Orya" typeface="Kalinga"/>
+        <a:font script="Mlym" typeface="Kartika"/>
+        <a:font script="Laoo" typeface="DokChampa"/>
+        <a:font script="Sinh" typeface="Iskoola Pota"/>
+        <a:font script="Mong" typeface="Mongolian Baiti"/>
+        <a:font script="Viet" typeface="Arial"/>
+        <a:font script="Uigh" typeface="Microsoft Uighur"/>
+        <a:font script="Geor" typeface="Sylfaen"/>
+      </a:minorFont>
+    </a:fontScheme>
+    <a:fmtScheme name="Office">
+      <a:fillStyleLst>
+        <a:solidFill>
+          <a:schemeClr val="phClr"/>
+        </a:solidFill>
+        <a:gradFill rotWithShape="1">
+          <a:gsLst>
+            <a:gs pos="0">
+              <a:schemeClr val="phClr">
+                <a:lumMod val="110000"/>
+                <a:satMod val="105000"/>
+                <a:tint val="67000"/>
+              </a:schemeClr>
+            </a:gs>
+            <a:gs pos="50000">
+              <a:schemeClr val="phClr">
+                <a:lumMod val="105000"/>
+                <a:satMod val="103000"/>
+                <a:tint val="73000"/>
+              </a:schemeClr>
+            </a:gs>
+            <a:gs pos="100000">
+              <a:schemeClr val="phClr">
+                <a:lumMod val="105000"/>
+                <a:satMod val="109000"/>
+                <a:tint val="81000"/>
+              </a:schemeClr>
+            </a:gs>
+          </a:gsLst>
+          <a:lin ang="5400000" scaled="0"/>
+        </a:gradFill>
+        <a:gradFill rotWithShape="1">
+          <a:gsLst>
+            <a:gs pos="0">
+              <a:schemeClr val="phClr">
+                <a:satMod val="103000"/>
+                <a:lumMod val="102000"/>
+                <a:tint val="94000"/>
+              </a:schemeClr>
+            </a:gs>
+            <a:gs pos="50000">
+              <a:schemeClr val="phClr">
+                <a:satMod val="110000"/>
+                <a:lumMod val="100000"/>
+                <a:shade val="100000"/>
+              </a:schemeClr>
+            </a:gs>
+            <a:gs pos="100000">
+              <a:schemeClr val="phClr">
+                <a:lumMod val="99000"/>
+                <a:satMod val="120000"/>
+                <a:shade val="78000"/>
+              </a:schemeClr>
+            </a:gs>
+          </a:gsLst>
+          <a:lin ang="5400000" scaled="0"/>
+        </a:gradFill>
+      </a:fillStyleLst>
+      <a:lnStyleLst>
+        <a:ln w="6350" cap="flat" cmpd="sng" algn="ctr">
+          <a:solidFill>
+            <a:schemeClr val="phClr"/>
+          </a:solidFill>
+          <a:prstDash val="solid"/>
+          <a:miter lim="800000"/>
+        </a:ln>
+        <a:ln w="12700" cap="flat" cmpd="sng" algn="ctr">
+          <a:solidFill>
+            <a:schemeClr val="phClr"/>
+          </a:solidFill>
+          <a:prstDash val="solid"/>
+          <a:miter lim="800000"/>
+        </a:ln>
+        <a:ln w="19050" cap="flat" cmpd="sng" algn="ctr">
+          <a:solidFill>
+            <a:schemeClr val="phClr"/>
+          </a:solidFill>
+          <a:prstDash val="solid"/>
+          <a:miter lim="800000"/>
+        </a:ln>
+      </a:lnStyleLst>
+      <a:effectStyleLst>
+        <a:effectStyle>
+          <a:effectLst/>
+        </a:effectStyle>
+        <a:effectStyle>
+          <a:effectLst/>
+        </a:effectStyle>
+        <a:effectStyle>
+          <a:effectLst>
+            <a:outerShdw blurRad="57150" dist="19050" dir="5400000" algn="ctr" rotWithShape="0">
+              <a:srgbClr val="000000">
+                <a:alpha val="63000"/>
+              </a:srgbClr>
+            </a:outerShdw>
+          </a:effectLst>
+        </a:effectStyle>
+      </a:effectStyleLst>
+      <a:bgFillStyleLst>
+        <a:solidFill>
+          <a:schemeClr val="phClr"/>
+        </a:solidFill>
+        <a:solidFill>
+          <a:schemeClr val="phClr">
+            <a:tint val="95000"/>
+            <a:satMod val="170000"/>
+          </a:schemeClr>
+        </a:solidFill>
+        <a:gradFill rotWithShape="1">
+          <a:gsLst>
+            <a:gs pos="0">
+              <a:schemeClr val="phClr">
+                <a:tint val="93000"/>
+                <a:satMod val="150000"/>
+                <a:shade val="98000"/>
+                <a:lumMod val="102000"/>
+              </a:schemeClr>
+            </a:gs>
+            <a:gs pos="50000">
+              <a:schemeClr val="phClr">
+                <a:tint val="98000"/>
+                <a:satMod val="130000"/>
+                <a:shade val="90000"/>
+                <a:lumMod val="103000"/>
+              </a:schemeClr>
+            </a:gs>
+            <a:gs pos="100000">
+              <a:schemeClr val="phClr">
+                <a:shade val="63000"/>
+                <a:satMod val="120000"/>
+              </a:schemeClr>
+            </a:gs>
+          </a:gsLst>
+          <a:lin ang="5400000" scaled="0"/>
+        </a:gradFill>
+      </a:bgFillStyleLst>
+    </a:fmtScheme>
+  </a:themeElements>
+  <a:objectDefaults/>
+  <a:extraClrSchemeLst/>
+  <a:extLst>
+    <a:ext uri="{05A4C25C-085E-4340-85A3-A5531E510DB2}">
+      <thm15:themeFamily xmlns:thm15="http://schemas.microsoft.com/office/thememl/2012/main" name="Office Theme" id="{62F939B6-93AF-4DB8-9C6B-D6C7DFDC589F}" vid="{4A3C46E8-61CC-4603-A589-7422A47A8E4A}"/>
+    </a:ext>
+  </a:extLst>
+</a:theme>
 </file>
</xml_diff>

<commit_message>
added adapted versions of the logo
</commit_message>
<xml_diff>
--- a/src/site/resources/images/teetime.pptx
+++ b/src/site/resources/images/teetime.pptx
@@ -220,7 +220,7 @@
           <a:p>
             <a:fld id="{35FB3322-8137-4149-9F14-9A06CD7D0F5A}" type="datetimeFigureOut">
               <a:rPr lang="de-DE" smtClean="0"/>
-              <a:t>16.12.2014</a:t>
+              <a:t>17.12.2014</a:t>
             </a:fld>
             <a:endParaRPr lang="de-DE"/>
           </a:p>
@@ -1459,7 +1459,7 @@
           <a:p>
             <a:fld id="{B65606E3-788B-4D39-8065-BBA1684B78E5}" type="datetimeFigureOut">
               <a:rPr lang="de-DE" smtClean="0"/>
-              <a:t>16.12.2014</a:t>
+              <a:t>17.12.2014</a:t>
             </a:fld>
             <a:endParaRPr lang="de-DE"/>
           </a:p>
@@ -1629,7 +1629,7 @@
           <a:p>
             <a:fld id="{B65606E3-788B-4D39-8065-BBA1684B78E5}" type="datetimeFigureOut">
               <a:rPr lang="de-DE" smtClean="0"/>
-              <a:t>16.12.2014</a:t>
+              <a:t>17.12.2014</a:t>
             </a:fld>
             <a:endParaRPr lang="de-DE"/>
           </a:p>
@@ -1809,7 +1809,7 @@
           <a:p>
             <a:fld id="{B65606E3-788B-4D39-8065-BBA1684B78E5}" type="datetimeFigureOut">
               <a:rPr lang="de-DE" smtClean="0"/>
-              <a:t>16.12.2014</a:t>
+              <a:t>17.12.2014</a:t>
             </a:fld>
             <a:endParaRPr lang="de-DE"/>
           </a:p>
@@ -1979,7 +1979,7 @@
           <a:p>
             <a:fld id="{B65606E3-788B-4D39-8065-BBA1684B78E5}" type="datetimeFigureOut">
               <a:rPr lang="de-DE" smtClean="0"/>
-              <a:t>16.12.2014</a:t>
+              <a:t>17.12.2014</a:t>
             </a:fld>
             <a:endParaRPr lang="de-DE"/>
           </a:p>
@@ -2225,7 +2225,7 @@
           <a:p>
             <a:fld id="{B65606E3-788B-4D39-8065-BBA1684B78E5}" type="datetimeFigureOut">
               <a:rPr lang="de-DE" smtClean="0"/>
-              <a:t>16.12.2014</a:t>
+              <a:t>17.12.2014</a:t>
             </a:fld>
             <a:endParaRPr lang="de-DE"/>
           </a:p>
@@ -2457,7 +2457,7 @@
           <a:p>
             <a:fld id="{B65606E3-788B-4D39-8065-BBA1684B78E5}" type="datetimeFigureOut">
               <a:rPr lang="de-DE" smtClean="0"/>
-              <a:t>16.12.2014</a:t>
+              <a:t>17.12.2014</a:t>
             </a:fld>
             <a:endParaRPr lang="de-DE"/>
           </a:p>
@@ -2824,7 +2824,7 @@
           <a:p>
             <a:fld id="{B65606E3-788B-4D39-8065-BBA1684B78E5}" type="datetimeFigureOut">
               <a:rPr lang="de-DE" smtClean="0"/>
-              <a:t>16.12.2014</a:t>
+              <a:t>17.12.2014</a:t>
             </a:fld>
             <a:endParaRPr lang="de-DE"/>
           </a:p>
@@ -2942,7 +2942,7 @@
           <a:p>
             <a:fld id="{B65606E3-788B-4D39-8065-BBA1684B78E5}" type="datetimeFigureOut">
               <a:rPr lang="de-DE" smtClean="0"/>
-              <a:t>16.12.2014</a:t>
+              <a:t>17.12.2014</a:t>
             </a:fld>
             <a:endParaRPr lang="de-DE"/>
           </a:p>
@@ -3037,7 +3037,7 @@
           <a:p>
             <a:fld id="{B65606E3-788B-4D39-8065-BBA1684B78E5}" type="datetimeFigureOut">
               <a:rPr lang="de-DE" smtClean="0"/>
-              <a:t>16.12.2014</a:t>
+              <a:t>17.12.2014</a:t>
             </a:fld>
             <a:endParaRPr lang="de-DE"/>
           </a:p>
@@ -3314,7 +3314,7 @@
           <a:p>
             <a:fld id="{B65606E3-788B-4D39-8065-BBA1684B78E5}" type="datetimeFigureOut">
               <a:rPr lang="de-DE" smtClean="0"/>
-              <a:t>16.12.2014</a:t>
+              <a:t>17.12.2014</a:t>
             </a:fld>
             <a:endParaRPr lang="de-DE"/>
           </a:p>
@@ -3567,7 +3567,7 @@
           <a:p>
             <a:fld id="{B65606E3-788B-4D39-8065-BBA1684B78E5}" type="datetimeFigureOut">
               <a:rPr lang="de-DE" smtClean="0"/>
-              <a:t>16.12.2014</a:t>
+              <a:t>17.12.2014</a:t>
             </a:fld>
             <a:endParaRPr lang="de-DE"/>
           </a:p>
@@ -3780,7 +3780,7 @@
           <a:p>
             <a:fld id="{B65606E3-788B-4D39-8065-BBA1684B78E5}" type="datetimeFigureOut">
               <a:rPr lang="de-DE" smtClean="0"/>
-              <a:t>16.12.2014</a:t>
+              <a:t>17.12.2014</a:t>
             </a:fld>
             <a:endParaRPr lang="de-DE"/>
           </a:p>
@@ -8730,6 +8730,593 @@
           </a:prstGeom>
         </p:spPr>
       </p:pic>
+      <p:sp>
+        <p:nvSpPr>
+          <p:cNvPr id="24" name="TextBox 23"/>
+          <p:cNvSpPr txBox="1"/>
+          <p:nvPr/>
+        </p:nvSpPr>
+        <p:spPr>
+          <a:xfrm>
+            <a:off x="4413086" y="3176286"/>
+            <a:ext cx="1379545" cy="615553"/>
+          </a:xfrm>
+          <a:prstGeom prst="rect">
+            <a:avLst/>
+          </a:prstGeom>
+          <a:noFill/>
+        </p:spPr>
+        <p:txBody>
+          <a:bodyPr wrap="none" tIns="0" rIns="0" bIns="0" rtlCol="0">
+            <a:spAutoFit/>
+          </a:bodyPr>
+          <a:lstStyle/>
+          <a:p>
+            <a:r>
+              <a:rPr lang="de-DE" sz="4000" dirty="0" smtClean="0">
+                <a:ln w="0"/>
+                <a:solidFill>
+                  <a:schemeClr val="tx1">
+                    <a:lumMod val="75000"/>
+                    <a:lumOff val="25000"/>
+                  </a:schemeClr>
+                </a:solidFill>
+                <a:effectLst/>
+              </a:rPr>
+              <a:t>eeTim</a:t>
+            </a:r>
+            <a:endParaRPr lang="de-DE" sz="4000" dirty="0">
+              <a:ln w="0"/>
+              <a:solidFill>
+                <a:schemeClr val="tx1">
+                  <a:lumMod val="75000"/>
+                  <a:lumOff val="25000"/>
+                </a:schemeClr>
+              </a:solidFill>
+              <a:effectLst/>
+            </a:endParaRPr>
+          </a:p>
+        </p:txBody>
+      </p:sp>
+      <p:sp>
+        <p:nvSpPr>
+          <p:cNvPr id="25" name="TextBox 24"/>
+          <p:cNvSpPr txBox="1"/>
+          <p:nvPr/>
+        </p:nvSpPr>
+        <p:spPr>
+          <a:xfrm>
+            <a:off x="4225534" y="2939054"/>
+            <a:ext cx="375103" cy="923330"/>
+          </a:xfrm>
+          <a:prstGeom prst="rect">
+            <a:avLst/>
+          </a:prstGeom>
+          <a:noFill/>
+          <a:effectLst/>
+        </p:spPr>
+        <p:txBody>
+          <a:bodyPr wrap="none" lIns="0" tIns="0" rIns="0" bIns="0" rtlCol="0">
+            <a:spAutoFit/>
+          </a:bodyPr>
+          <a:lstStyle/>
+          <a:p>
+            <a:r>
+              <a:rPr lang="de-DE" sz="6000" dirty="0" smtClean="0">
+                <a:ln w="0"/>
+                <a:solidFill>
+                  <a:schemeClr val="tx1">
+                    <a:lumMod val="75000"/>
+                    <a:lumOff val="25000"/>
+                  </a:schemeClr>
+                </a:solidFill>
+                <a:effectLst/>
+              </a:rPr>
+              <a:t>T</a:t>
+            </a:r>
+            <a:endParaRPr lang="de-DE" sz="6000" dirty="0">
+              <a:ln w="0"/>
+              <a:solidFill>
+                <a:schemeClr val="tx1">
+                  <a:lumMod val="75000"/>
+                  <a:lumOff val="25000"/>
+                </a:schemeClr>
+              </a:solidFill>
+              <a:effectLst/>
+            </a:endParaRPr>
+          </a:p>
+        </p:txBody>
+      </p:sp>
+      <p:sp>
+        <p:nvSpPr>
+          <p:cNvPr id="26" name="TextBox 25"/>
+          <p:cNvSpPr txBox="1"/>
+          <p:nvPr/>
+        </p:nvSpPr>
+        <p:spPr>
+          <a:xfrm>
+            <a:off x="5681976" y="3127256"/>
+            <a:ext cx="379207" cy="754053"/>
+          </a:xfrm>
+          <a:prstGeom prst="rect">
+            <a:avLst/>
+          </a:prstGeom>
+          <a:noFill/>
+        </p:spPr>
+        <p:txBody>
+          <a:bodyPr wrap="square" rIns="0" rtlCol="0">
+            <a:spAutoFit/>
+          </a:bodyPr>
+          <a:lstStyle/>
+          <a:p>
+            <a:r>
+              <a:rPr lang="de-DE" sz="4300" dirty="0">
+                <a:ln w="0"/>
+                <a:solidFill>
+                  <a:schemeClr val="tx1">
+                    <a:lumMod val="75000"/>
+                    <a:lumOff val="25000"/>
+                  </a:schemeClr>
+                </a:solidFill>
+                <a:effectLst/>
+              </a:rPr>
+              <a:t>≡</a:t>
+            </a:r>
+            <a:endParaRPr lang="de-DE" sz="4300" dirty="0">
+              <a:effectLst/>
+            </a:endParaRPr>
+          </a:p>
+        </p:txBody>
+      </p:sp>
+      <p:sp>
+        <p:nvSpPr>
+          <p:cNvPr id="27" name="TextBox 26"/>
+          <p:cNvSpPr txBox="1"/>
+          <p:nvPr/>
+        </p:nvSpPr>
+        <p:spPr>
+          <a:xfrm>
+            <a:off x="4413086" y="4502277"/>
+            <a:ext cx="1610377" cy="615553"/>
+          </a:xfrm>
+          <a:prstGeom prst="rect">
+            <a:avLst/>
+          </a:prstGeom>
+          <a:noFill/>
+        </p:spPr>
+        <p:txBody>
+          <a:bodyPr wrap="none" tIns="0" rIns="0" bIns="0" rtlCol="0">
+            <a:spAutoFit/>
+          </a:bodyPr>
+          <a:lstStyle/>
+          <a:p>
+            <a:r>
+              <a:rPr lang="de-DE" sz="4000" dirty="0" smtClean="0">
+                <a:ln w="0"/>
+                <a:solidFill>
+                  <a:schemeClr val="tx1">
+                    <a:lumMod val="75000"/>
+                    <a:lumOff val="25000"/>
+                  </a:schemeClr>
+                </a:solidFill>
+                <a:effectLst/>
+              </a:rPr>
+              <a:t>e  Time</a:t>
+            </a:r>
+            <a:endParaRPr lang="de-DE" sz="4000" dirty="0">
+              <a:ln w="0"/>
+              <a:solidFill>
+                <a:schemeClr val="tx1">
+                  <a:lumMod val="75000"/>
+                  <a:lumOff val="25000"/>
+                </a:schemeClr>
+              </a:solidFill>
+              <a:effectLst/>
+            </a:endParaRPr>
+          </a:p>
+        </p:txBody>
+      </p:sp>
+      <p:sp>
+        <p:nvSpPr>
+          <p:cNvPr id="28" name="TextBox 27"/>
+          <p:cNvSpPr txBox="1"/>
+          <p:nvPr/>
+        </p:nvSpPr>
+        <p:spPr>
+          <a:xfrm>
+            <a:off x="4225534" y="4265045"/>
+            <a:ext cx="375103" cy="923330"/>
+          </a:xfrm>
+          <a:prstGeom prst="rect">
+            <a:avLst/>
+          </a:prstGeom>
+          <a:noFill/>
+          <a:effectLst/>
+        </p:spPr>
+        <p:txBody>
+          <a:bodyPr wrap="none" lIns="0" tIns="0" rIns="0" bIns="0" rtlCol="0">
+            <a:spAutoFit/>
+          </a:bodyPr>
+          <a:lstStyle/>
+          <a:p>
+            <a:r>
+              <a:rPr lang="de-DE" sz="6000" dirty="0" smtClean="0">
+                <a:ln w="0"/>
+                <a:solidFill>
+                  <a:schemeClr val="tx1">
+                    <a:lumMod val="75000"/>
+                    <a:lumOff val="25000"/>
+                  </a:schemeClr>
+                </a:solidFill>
+                <a:effectLst/>
+              </a:rPr>
+              <a:t>T</a:t>
+            </a:r>
+            <a:endParaRPr lang="de-DE" sz="6000" dirty="0">
+              <a:ln w="0"/>
+              <a:solidFill>
+                <a:schemeClr val="tx1">
+                  <a:lumMod val="75000"/>
+                  <a:lumOff val="25000"/>
+                </a:schemeClr>
+              </a:solidFill>
+              <a:effectLst/>
+            </a:endParaRPr>
+          </a:p>
+        </p:txBody>
+      </p:sp>
+      <p:sp>
+        <p:nvSpPr>
+          <p:cNvPr id="29" name="TextBox 28"/>
+          <p:cNvSpPr txBox="1"/>
+          <p:nvPr/>
+        </p:nvSpPr>
+        <p:spPr>
+          <a:xfrm>
+            <a:off x="4647914" y="4457628"/>
+            <a:ext cx="379207" cy="754053"/>
+          </a:xfrm>
+          <a:prstGeom prst="rect">
+            <a:avLst/>
+          </a:prstGeom>
+          <a:noFill/>
+        </p:spPr>
+        <p:txBody>
+          <a:bodyPr wrap="square" rIns="0" rtlCol="0">
+            <a:spAutoFit/>
+          </a:bodyPr>
+          <a:lstStyle/>
+          <a:p>
+            <a:r>
+              <a:rPr lang="de-DE" sz="4300" dirty="0">
+                <a:ln w="0"/>
+                <a:solidFill>
+                  <a:schemeClr val="tx1">
+                    <a:lumMod val="75000"/>
+                    <a:lumOff val="25000"/>
+                  </a:schemeClr>
+                </a:solidFill>
+                <a:effectLst/>
+              </a:rPr>
+              <a:t>≡</a:t>
+            </a:r>
+            <a:endParaRPr lang="de-DE" sz="4300" dirty="0">
+              <a:effectLst/>
+            </a:endParaRPr>
+          </a:p>
+        </p:txBody>
+      </p:sp>
+      <p:sp>
+        <p:nvSpPr>
+          <p:cNvPr id="30" name="TextBox 29"/>
+          <p:cNvSpPr txBox="1"/>
+          <p:nvPr/>
+        </p:nvSpPr>
+        <p:spPr>
+          <a:xfrm>
+            <a:off x="4934923" y="5542626"/>
+            <a:ext cx="1124667" cy="615553"/>
+          </a:xfrm>
+          <a:prstGeom prst="rect">
+            <a:avLst/>
+          </a:prstGeom>
+          <a:noFill/>
+        </p:spPr>
+        <p:txBody>
+          <a:bodyPr wrap="none" tIns="0" rIns="0" bIns="0" rtlCol="0">
+            <a:spAutoFit/>
+          </a:bodyPr>
+          <a:lstStyle/>
+          <a:p>
+            <a:r>
+              <a:rPr lang="de-DE" sz="4000" dirty="0" smtClean="0">
+                <a:ln w="0"/>
+                <a:solidFill>
+                  <a:schemeClr val="tx1">
+                    <a:lumMod val="75000"/>
+                    <a:lumOff val="25000"/>
+                  </a:schemeClr>
+                </a:solidFill>
+                <a:effectLst/>
+              </a:rPr>
+              <a:t>Time</a:t>
+            </a:r>
+            <a:endParaRPr lang="de-DE" sz="4000" dirty="0">
+              <a:ln w="0"/>
+              <a:solidFill>
+                <a:schemeClr val="tx1">
+                  <a:lumMod val="75000"/>
+                  <a:lumOff val="25000"/>
+                </a:schemeClr>
+              </a:solidFill>
+              <a:effectLst/>
+            </a:endParaRPr>
+          </a:p>
+        </p:txBody>
+      </p:sp>
+      <p:sp>
+        <p:nvSpPr>
+          <p:cNvPr id="31" name="TextBox 30"/>
+          <p:cNvSpPr txBox="1"/>
+          <p:nvPr/>
+        </p:nvSpPr>
+        <p:spPr>
+          <a:xfrm>
+            <a:off x="4227690" y="5306565"/>
+            <a:ext cx="375103" cy="923330"/>
+          </a:xfrm>
+          <a:prstGeom prst="rect">
+            <a:avLst/>
+          </a:prstGeom>
+          <a:noFill/>
+          <a:effectLst/>
+        </p:spPr>
+        <p:txBody>
+          <a:bodyPr wrap="none" lIns="0" tIns="0" rIns="0" bIns="0" rtlCol="0">
+            <a:spAutoFit/>
+          </a:bodyPr>
+          <a:lstStyle/>
+          <a:p>
+            <a:r>
+              <a:rPr lang="de-DE" sz="6000" dirty="0" smtClean="0">
+                <a:ln w="0"/>
+                <a:solidFill>
+                  <a:schemeClr val="tx1">
+                    <a:lumMod val="75000"/>
+                    <a:lumOff val="25000"/>
+                  </a:schemeClr>
+                </a:solidFill>
+                <a:effectLst/>
+              </a:rPr>
+              <a:t>T</a:t>
+            </a:r>
+            <a:endParaRPr lang="de-DE" sz="6000" dirty="0">
+              <a:ln w="0"/>
+              <a:solidFill>
+                <a:schemeClr val="tx1">
+                  <a:lumMod val="75000"/>
+                  <a:lumOff val="25000"/>
+                </a:schemeClr>
+              </a:solidFill>
+              <a:effectLst/>
+            </a:endParaRPr>
+          </a:p>
+        </p:txBody>
+      </p:sp>
+      <p:sp>
+        <p:nvSpPr>
+          <p:cNvPr id="32" name="TextBox 31"/>
+          <p:cNvSpPr txBox="1"/>
+          <p:nvPr/>
+        </p:nvSpPr>
+        <p:spPr>
+          <a:xfrm>
+            <a:off x="4400313" y="5505833"/>
+            <a:ext cx="702545" cy="723275"/>
+          </a:xfrm>
+          <a:prstGeom prst="rect">
+            <a:avLst/>
+          </a:prstGeom>
+          <a:noFill/>
+        </p:spPr>
+        <p:txBody>
+          <a:bodyPr wrap="square" rIns="0" rtlCol="0">
+            <a:spAutoFit/>
+          </a:bodyPr>
+          <a:lstStyle/>
+          <a:p>
+            <a:r>
+              <a:rPr lang="de-DE" sz="4100" dirty="0" smtClean="0">
+                <a:ln w="0"/>
+                <a:solidFill>
+                  <a:schemeClr val="tx1">
+                    <a:lumMod val="75000"/>
+                    <a:lumOff val="25000"/>
+                  </a:schemeClr>
+                </a:solidFill>
+              </a:rPr>
+              <a:t>≡≡</a:t>
+            </a:r>
+            <a:endParaRPr lang="de-DE" sz="4100" dirty="0"/>
+          </a:p>
+        </p:txBody>
+      </p:sp>
+      <p:sp>
+        <p:nvSpPr>
+          <p:cNvPr id="37" name="TextBox 36"/>
+          <p:cNvSpPr txBox="1"/>
+          <p:nvPr/>
+        </p:nvSpPr>
+        <p:spPr>
+          <a:xfrm>
+            <a:off x="4898796" y="464420"/>
+            <a:ext cx="869790" cy="615553"/>
+          </a:xfrm>
+          <a:prstGeom prst="rect">
+            <a:avLst/>
+          </a:prstGeom>
+          <a:noFill/>
+        </p:spPr>
+        <p:txBody>
+          <a:bodyPr wrap="none" tIns="0" rIns="0" bIns="0" rtlCol="0">
+            <a:spAutoFit/>
+          </a:bodyPr>
+          <a:lstStyle/>
+          <a:p>
+            <a:r>
+              <a:rPr lang="de-DE" sz="4000" dirty="0" smtClean="0">
+                <a:ln w="0"/>
+                <a:solidFill>
+                  <a:schemeClr val="tx1">
+                    <a:lumMod val="75000"/>
+                    <a:lumOff val="25000"/>
+                  </a:schemeClr>
+                </a:solidFill>
+                <a:effectLst/>
+              </a:rPr>
+              <a:t>Tim</a:t>
+            </a:r>
+            <a:endParaRPr lang="de-DE" sz="4000" dirty="0">
+              <a:ln w="0"/>
+              <a:solidFill>
+                <a:schemeClr val="tx1">
+                  <a:lumMod val="75000"/>
+                  <a:lumOff val="25000"/>
+                </a:schemeClr>
+              </a:solidFill>
+              <a:effectLst/>
+            </a:endParaRPr>
+          </a:p>
+        </p:txBody>
+      </p:sp>
+      <p:sp>
+        <p:nvSpPr>
+          <p:cNvPr id="38" name="TextBox 37"/>
+          <p:cNvSpPr txBox="1"/>
+          <p:nvPr/>
+        </p:nvSpPr>
+        <p:spPr>
+          <a:xfrm>
+            <a:off x="4191563" y="228359"/>
+            <a:ext cx="375103" cy="923330"/>
+          </a:xfrm>
+          <a:prstGeom prst="rect">
+            <a:avLst/>
+          </a:prstGeom>
+          <a:noFill/>
+          <a:effectLst/>
+        </p:spPr>
+        <p:txBody>
+          <a:bodyPr wrap="none" lIns="0" tIns="0" rIns="0" bIns="0" rtlCol="0">
+            <a:spAutoFit/>
+          </a:bodyPr>
+          <a:lstStyle/>
+          <a:p>
+            <a:r>
+              <a:rPr lang="de-DE" sz="6000" dirty="0" smtClean="0">
+                <a:ln w="0"/>
+                <a:solidFill>
+                  <a:schemeClr val="tx1">
+                    <a:lumMod val="75000"/>
+                    <a:lumOff val="25000"/>
+                  </a:schemeClr>
+                </a:solidFill>
+                <a:effectLst/>
+              </a:rPr>
+              <a:t>T</a:t>
+            </a:r>
+            <a:endParaRPr lang="de-DE" sz="6000" dirty="0">
+              <a:ln w="0"/>
+              <a:solidFill>
+                <a:schemeClr val="tx1">
+                  <a:lumMod val="75000"/>
+                  <a:lumOff val="25000"/>
+                </a:schemeClr>
+              </a:solidFill>
+              <a:effectLst/>
+            </a:endParaRPr>
+          </a:p>
+        </p:txBody>
+      </p:sp>
+      <p:sp>
+        <p:nvSpPr>
+          <p:cNvPr id="39" name="TextBox 38"/>
+          <p:cNvSpPr txBox="1"/>
+          <p:nvPr/>
+        </p:nvSpPr>
+        <p:spPr>
+          <a:xfrm>
+            <a:off x="4364186" y="408965"/>
+            <a:ext cx="702545" cy="754053"/>
+          </a:xfrm>
+          <a:prstGeom prst="rect">
+            <a:avLst/>
+          </a:prstGeom>
+          <a:noFill/>
+        </p:spPr>
+        <p:txBody>
+          <a:bodyPr wrap="square" rIns="0" rtlCol="0">
+            <a:spAutoFit/>
+          </a:bodyPr>
+          <a:lstStyle/>
+          <a:p>
+            <a:r>
+              <a:rPr lang="de-DE" sz="4200" dirty="0" smtClean="0">
+                <a:ln w="0"/>
+                <a:solidFill>
+                  <a:schemeClr val="tx1">
+                    <a:lumMod val="75000"/>
+                    <a:lumOff val="25000"/>
+                  </a:schemeClr>
+                </a:solidFill>
+              </a:rPr>
+              <a:t>≡≡</a:t>
+            </a:r>
+            <a:endParaRPr lang="de-DE" sz="4200" dirty="0"/>
+          </a:p>
+        </p:txBody>
+      </p:sp>
+      <p:sp>
+        <p:nvSpPr>
+          <p:cNvPr id="40" name="TextBox 39"/>
+          <p:cNvSpPr txBox="1"/>
+          <p:nvPr/>
+        </p:nvSpPr>
+        <p:spPr>
+          <a:xfrm>
+            <a:off x="5680383" y="413469"/>
+            <a:ext cx="379207" cy="754053"/>
+          </a:xfrm>
+          <a:prstGeom prst="rect">
+            <a:avLst/>
+          </a:prstGeom>
+          <a:noFill/>
+        </p:spPr>
+        <p:txBody>
+          <a:bodyPr wrap="square" rIns="0" rtlCol="0">
+            <a:spAutoFit/>
+          </a:bodyPr>
+          <a:lstStyle/>
+          <a:p>
+            <a:r>
+              <a:rPr lang="de-DE" sz="4300" dirty="0">
+                <a:ln w="0"/>
+                <a:solidFill>
+                  <a:schemeClr val="tx1">
+                    <a:lumMod val="75000"/>
+                    <a:lumOff val="25000"/>
+                  </a:schemeClr>
+                </a:solidFill>
+                <a:effectLst/>
+              </a:rPr>
+              <a:t>≡</a:t>
+            </a:r>
+            <a:endParaRPr lang="de-DE" sz="4300" dirty="0">
+              <a:effectLst/>
+            </a:endParaRPr>
+          </a:p>
+        </p:txBody>
+      </p:sp>
     </p:spTree>
     <p:extLst>
       <p:ext uri="{BB962C8B-B14F-4D97-AF65-F5344CB8AC3E}">

</xml_diff>

<commit_message>
updated colors and ports of the stage pictures
</commit_message>
<xml_diff>
--- a/src/site/resources/images/teetime.pptx
+++ b/src/site/resources/images/teetime.pptx
@@ -221,7 +221,7 @@
           <a:p>
             <a:fld id="{35FB3322-8137-4149-9F14-9A06CD7D0F5A}" type="datetimeFigureOut">
               <a:rPr lang="de-DE" smtClean="0"/>
-              <a:t>23.09.2015</a:t>
+              <a:t>30.09.2015</a:t>
             </a:fld>
             <a:endParaRPr lang="de-DE"/>
           </a:p>
@@ -1460,7 +1460,7 @@
           <a:p>
             <a:fld id="{B65606E3-788B-4D39-8065-BBA1684B78E5}" type="datetimeFigureOut">
               <a:rPr lang="de-DE" smtClean="0"/>
-              <a:t>23.09.2015</a:t>
+              <a:t>30.09.2015</a:t>
             </a:fld>
             <a:endParaRPr lang="de-DE"/>
           </a:p>
@@ -1630,7 +1630,7 @@
           <a:p>
             <a:fld id="{B65606E3-788B-4D39-8065-BBA1684B78E5}" type="datetimeFigureOut">
               <a:rPr lang="de-DE" smtClean="0"/>
-              <a:t>23.09.2015</a:t>
+              <a:t>30.09.2015</a:t>
             </a:fld>
             <a:endParaRPr lang="de-DE"/>
           </a:p>
@@ -1810,7 +1810,7 @@
           <a:p>
             <a:fld id="{B65606E3-788B-4D39-8065-BBA1684B78E5}" type="datetimeFigureOut">
               <a:rPr lang="de-DE" smtClean="0"/>
-              <a:t>23.09.2015</a:t>
+              <a:t>30.09.2015</a:t>
             </a:fld>
             <a:endParaRPr lang="de-DE"/>
           </a:p>
@@ -1980,7 +1980,7 @@
           <a:p>
             <a:fld id="{B65606E3-788B-4D39-8065-BBA1684B78E5}" type="datetimeFigureOut">
               <a:rPr lang="de-DE" smtClean="0"/>
-              <a:t>23.09.2015</a:t>
+              <a:t>30.09.2015</a:t>
             </a:fld>
             <a:endParaRPr lang="de-DE"/>
           </a:p>
@@ -2226,7 +2226,7 @@
           <a:p>
             <a:fld id="{B65606E3-788B-4D39-8065-BBA1684B78E5}" type="datetimeFigureOut">
               <a:rPr lang="de-DE" smtClean="0"/>
-              <a:t>23.09.2015</a:t>
+              <a:t>30.09.2015</a:t>
             </a:fld>
             <a:endParaRPr lang="de-DE"/>
           </a:p>
@@ -2458,7 +2458,7 @@
           <a:p>
             <a:fld id="{B65606E3-788B-4D39-8065-BBA1684B78E5}" type="datetimeFigureOut">
               <a:rPr lang="de-DE" smtClean="0"/>
-              <a:t>23.09.2015</a:t>
+              <a:t>30.09.2015</a:t>
             </a:fld>
             <a:endParaRPr lang="de-DE"/>
           </a:p>
@@ -2825,7 +2825,7 @@
           <a:p>
             <a:fld id="{B65606E3-788B-4D39-8065-BBA1684B78E5}" type="datetimeFigureOut">
               <a:rPr lang="de-DE" smtClean="0"/>
-              <a:t>23.09.2015</a:t>
+              <a:t>30.09.2015</a:t>
             </a:fld>
             <a:endParaRPr lang="de-DE"/>
           </a:p>
@@ -2943,7 +2943,7 @@
           <a:p>
             <a:fld id="{B65606E3-788B-4D39-8065-BBA1684B78E5}" type="datetimeFigureOut">
               <a:rPr lang="de-DE" smtClean="0"/>
-              <a:t>23.09.2015</a:t>
+              <a:t>30.09.2015</a:t>
             </a:fld>
             <a:endParaRPr lang="de-DE"/>
           </a:p>
@@ -3038,7 +3038,7 @@
           <a:p>
             <a:fld id="{B65606E3-788B-4D39-8065-BBA1684B78E5}" type="datetimeFigureOut">
               <a:rPr lang="de-DE" smtClean="0"/>
-              <a:t>23.09.2015</a:t>
+              <a:t>30.09.2015</a:t>
             </a:fld>
             <a:endParaRPr lang="de-DE"/>
           </a:p>
@@ -3315,7 +3315,7 @@
           <a:p>
             <a:fld id="{B65606E3-788B-4D39-8065-BBA1684B78E5}" type="datetimeFigureOut">
               <a:rPr lang="de-DE" smtClean="0"/>
-              <a:t>23.09.2015</a:t>
+              <a:t>30.09.2015</a:t>
             </a:fld>
             <a:endParaRPr lang="de-DE"/>
           </a:p>
@@ -3568,7 +3568,7 @@
           <a:p>
             <a:fld id="{B65606E3-788B-4D39-8065-BBA1684B78E5}" type="datetimeFigureOut">
               <a:rPr lang="de-DE" smtClean="0"/>
-              <a:t>23.09.2015</a:t>
+              <a:t>30.09.2015</a:t>
             </a:fld>
             <a:endParaRPr lang="de-DE"/>
           </a:p>
@@ -3781,7 +3781,7 @@
           <a:p>
             <a:fld id="{B65606E3-788B-4D39-8065-BBA1684B78E5}" type="datetimeFigureOut">
               <a:rPr lang="de-DE" smtClean="0"/>
-              <a:t>23.09.2015</a:t>
+              <a:t>30.09.2015</a:t>
             </a:fld>
             <a:endParaRPr lang="de-DE"/>
           </a:p>
@@ -4970,6 +4970,90 @@
           <a:chExt cx="0" cy="0"/>
         </a:xfrm>
       </p:grpSpPr>
+      <p:sp>
+        <p:nvSpPr>
+          <p:cNvPr id="45" name="Rectangle 44"/>
+          <p:cNvSpPr/>
+          <p:nvPr/>
+        </p:nvSpPr>
+        <p:spPr>
+          <a:xfrm>
+            <a:off x="416400" y="5620937"/>
+            <a:ext cx="144016" cy="144016"/>
+          </a:xfrm>
+          <a:prstGeom prst="rect">
+            <a:avLst/>
+          </a:prstGeom>
+          <a:noFill/>
+          <a:ln>
+            <a:noFill/>
+          </a:ln>
+        </p:spPr>
+        <p:style>
+          <a:lnRef idx="2">
+            <a:schemeClr val="accent3"/>
+          </a:lnRef>
+          <a:fillRef idx="1">
+            <a:schemeClr val="lt1"/>
+          </a:fillRef>
+          <a:effectRef idx="0">
+            <a:schemeClr val="accent3"/>
+          </a:effectRef>
+          <a:fontRef idx="minor">
+            <a:schemeClr val="dk1"/>
+          </a:fontRef>
+        </p:style>
+        <p:txBody>
+          <a:bodyPr rtlCol="0" anchor="ctr"/>
+          <a:lstStyle/>
+          <a:p>
+            <a:pPr algn="ctr"/>
+            <a:endParaRPr lang="de-DE"/>
+          </a:p>
+        </p:txBody>
+      </p:sp>
+      <p:sp>
+        <p:nvSpPr>
+          <p:cNvPr id="40" name="Rectangle 39"/>
+          <p:cNvSpPr/>
+          <p:nvPr/>
+        </p:nvSpPr>
+        <p:spPr>
+          <a:xfrm>
+            <a:off x="1989579" y="982330"/>
+            <a:ext cx="144016" cy="144016"/>
+          </a:xfrm>
+          <a:prstGeom prst="rect">
+            <a:avLst/>
+          </a:prstGeom>
+          <a:noFill/>
+          <a:ln>
+            <a:noFill/>
+          </a:ln>
+        </p:spPr>
+        <p:style>
+          <a:lnRef idx="2">
+            <a:schemeClr val="accent3"/>
+          </a:lnRef>
+          <a:fillRef idx="1">
+            <a:schemeClr val="lt1"/>
+          </a:fillRef>
+          <a:effectRef idx="0">
+            <a:schemeClr val="accent3"/>
+          </a:effectRef>
+          <a:fontRef idx="minor">
+            <a:schemeClr val="dk1"/>
+          </a:fontRef>
+        </p:style>
+        <p:txBody>
+          <a:bodyPr rtlCol="0" anchor="ctr"/>
+          <a:lstStyle/>
+          <a:p>
+            <a:pPr algn="ctr"/>
+            <a:endParaRPr lang="de-DE"/>
+          </a:p>
+        </p:txBody>
+      </p:sp>
       <p:sp>
         <p:nvSpPr>
           <p:cNvPr id="3" name="Rounded Rectangle 2"/>

</xml_diff>